<commit_message>
changes for new SM
</commit_message>
<xml_diff>
--- a/SOLID Software Design Principles - without small methods.pptx
+++ b/SOLID Software Design Principles - without small methods.pptx
@@ -268,7 +268,7 @@
             <a:fld id="{CE22DD2D-CE48-432A-B750-FE638311F72D}" type="datetimeFigureOut">
               <a:rPr lang="en-US" smtClean="0"/>
               <a:pPr/>
-              <a:t>9/23/2009</a:t>
+              <a:t>2/23/2010</a:t>
             </a:fld>
             <a:endParaRPr lang="en-US"/>
           </a:p>
@@ -2983,7 +2983,7 @@
             <a:fld id="{C3F416CD-67A3-4CF0-A210-F6AF31AC147F}" type="datetimeFigureOut">
               <a:rPr lang="en-US" smtClean="0"/>
               <a:pPr/>
-              <a:t>9/23/2009</a:t>
+              <a:t>2/23/2010</a:t>
             </a:fld>
             <a:endParaRPr lang="en-US"/>
           </a:p>
@@ -3163,7 +3163,7 @@
             <a:fld id="{C3F416CD-67A3-4CF0-A210-F6AF31AC147F}" type="datetimeFigureOut">
               <a:rPr lang="en-US" smtClean="0"/>
               <a:pPr/>
-              <a:t>9/23/2009</a:t>
+              <a:t>2/23/2010</a:t>
             </a:fld>
             <a:endParaRPr lang="en-US"/>
           </a:p>
@@ -3340,7 +3340,7 @@
             <a:fld id="{C3F416CD-67A3-4CF0-A210-F6AF31AC147F}" type="datetimeFigureOut">
               <a:rPr lang="en-US" smtClean="0"/>
               <a:pPr/>
-              <a:t>9/23/2009</a:t>
+              <a:t>2/23/2010</a:t>
             </a:fld>
             <a:endParaRPr lang="en-US"/>
           </a:p>
@@ -3507,7 +3507,7 @@
             <a:fld id="{C3F416CD-67A3-4CF0-A210-F6AF31AC147F}" type="datetimeFigureOut">
               <a:rPr lang="en-US" smtClean="0"/>
               <a:pPr/>
-              <a:t>9/23/2009</a:t>
+              <a:t>2/23/2010</a:t>
             </a:fld>
             <a:endParaRPr lang="en-US"/>
           </a:p>
@@ -3720,7 +3720,7 @@
             <a:fld id="{C3F416CD-67A3-4CF0-A210-F6AF31AC147F}" type="datetimeFigureOut">
               <a:rPr lang="en-US" smtClean="0"/>
               <a:pPr/>
-              <a:t>9/23/2009</a:t>
+              <a:t>2/23/2010</a:t>
             </a:fld>
             <a:endParaRPr lang="en-US"/>
           </a:p>
@@ -4005,7 +4005,7 @@
             <a:fld id="{C3F416CD-67A3-4CF0-A210-F6AF31AC147F}" type="datetimeFigureOut">
               <a:rPr lang="en-US" smtClean="0"/>
               <a:pPr/>
-              <a:t>9/23/2009</a:t>
+              <a:t>2/23/2010</a:t>
             </a:fld>
             <a:endParaRPr lang="en-US"/>
           </a:p>
@@ -4437,7 +4437,7 @@
             <a:fld id="{C3F416CD-67A3-4CF0-A210-F6AF31AC147F}" type="datetimeFigureOut">
               <a:rPr lang="en-US" smtClean="0"/>
               <a:pPr algn="l" eaLnBrk="1" latinLnBrk="0" hangingPunct="1"/>
-              <a:t>9/23/2009</a:t>
+              <a:t>2/23/2010</a:t>
             </a:fld>
             <a:endParaRPr lang="en-US"/>
           </a:p>
@@ -4557,7 +4557,7 @@
             <a:fld id="{C3F416CD-67A3-4CF0-A210-F6AF31AC147F}" type="datetimeFigureOut">
               <a:rPr lang="en-US" smtClean="0"/>
               <a:pPr/>
-              <a:t>9/23/2009</a:t>
+              <a:t>2/23/2010</a:t>
             </a:fld>
             <a:endParaRPr lang="en-US"/>
           </a:p>
@@ -4649,7 +4649,7 @@
             <a:fld id="{C3F416CD-67A3-4CF0-A210-F6AF31AC147F}" type="datetimeFigureOut">
               <a:rPr lang="en-US" smtClean="0"/>
               <a:pPr/>
-              <a:t>9/23/2009</a:t>
+              <a:t>2/23/2010</a:t>
             </a:fld>
             <a:endParaRPr lang="en-US"/>
           </a:p>
@@ -4940,7 +4940,7 @@
             <a:fld id="{C3F416CD-67A3-4CF0-A210-F6AF31AC147F}" type="datetimeFigureOut">
               <a:rPr lang="en-US" smtClean="0"/>
               <a:pPr/>
-              <a:t>9/23/2009</a:t>
+              <a:t>2/23/2010</a:t>
             </a:fld>
             <a:endParaRPr lang="en-US"/>
           </a:p>
@@ -5267,7 +5267,7 @@
             <a:fld id="{C3F416CD-67A3-4CF0-A210-F6AF31AC147F}" type="datetimeFigureOut">
               <a:rPr lang="en-US" smtClean="0"/>
               <a:pPr/>
-              <a:t>9/23/2009</a:t>
+              <a:t>2/23/2010</a:t>
             </a:fld>
             <a:endParaRPr lang="en-US"/>
           </a:p>
@@ -5488,7 +5488,7 @@
             <a:fld id="{C3F416CD-67A3-4CF0-A210-F6AF31AC147F}" type="datetimeFigureOut">
               <a:rPr lang="en-US" smtClean="0"/>
               <a:pPr algn="l" eaLnBrk="1" latinLnBrk="0" hangingPunct="1"/>
-              <a:t>9/23/2009</a:t>
+              <a:t>2/23/2010</a:t>
             </a:fld>
             <a:endParaRPr lang="en-US" sz="800" dirty="0">
               <a:solidFill>
@@ -5882,7 +5882,7 @@
           <p:nvPr/>
         </p:nvPicPr>
         <p:blipFill>
-          <a:blip r:embed="rId2"/>
+          <a:blip r:embed="rId2" cstate="print"/>
           <a:srcRect/>
           <a:stretch>
             <a:fillRect/>
@@ -7395,7 +7395,7 @@
           <p:nvPr/>
         </p:nvPicPr>
         <p:blipFill>
-          <a:blip r:embed="rId3"/>
+          <a:blip r:embed="rId3" cstate="print"/>
           <a:srcRect/>
           <a:stretch>
             <a:fillRect/>
@@ -9493,7 +9493,7 @@
           <p:nvPr/>
         </p:nvPicPr>
         <p:blipFill>
-          <a:blip r:embed="rId3"/>
+          <a:blip r:embed="rId3" cstate="print"/>
           <a:srcRect/>
           <a:stretch>
             <a:fillRect/>
@@ -12575,7 +12575,7 @@
           <p:nvPr/>
         </p:nvPicPr>
         <p:blipFill>
-          <a:blip r:embed="rId2"/>
+          <a:blip r:embed="rId2" cstate="print"/>
           <a:srcRect/>
           <a:stretch>
             <a:fillRect/>
@@ -13136,7 +13136,7 @@
           <p:nvPr/>
         </p:nvPicPr>
         <p:blipFill>
-          <a:blip r:embed="rId3"/>
+          <a:blip r:embed="rId3" cstate="print"/>
           <a:srcRect/>
           <a:stretch>
             <a:fillRect/>
@@ -14774,7 +14774,7 @@
           <p:nvPr/>
         </p:nvPicPr>
         <p:blipFill>
-          <a:blip r:embed="rId2"/>
+          <a:blip r:embed="rId2" cstate="print"/>
           <a:srcRect/>
           <a:stretch>
             <a:fillRect/>
@@ -16515,7 +16515,7 @@
           <p:nvPr/>
         </p:nvPicPr>
         <p:blipFill>
-          <a:blip r:embed="rId3"/>
+          <a:blip r:embed="rId3" cstate="print"/>
           <a:srcRect/>
           <a:stretch>
             <a:fillRect/>
@@ -16580,7 +16580,7 @@
           <p:nvPr/>
         </p:nvPicPr>
         <p:blipFill>
-          <a:blip r:embed="rId2"/>
+          <a:blip r:embed="rId2" cstate="print"/>
           <a:srcRect/>
           <a:stretch>
             <a:fillRect/>
@@ -17686,7 +17686,7 @@
           <p:nvPr/>
         </p:nvPicPr>
         <p:blipFill>
-          <a:blip r:embed="rId2"/>
+          <a:blip r:embed="rId2" cstate="print"/>
           <a:srcRect/>
           <a:stretch>
             <a:fillRect/>
@@ -19594,11 +19594,7 @@
             </a:r>
             <a:r>
               <a:rPr lang="en-US" dirty="0" smtClean="0"/>
-              <a:t> </a:t>
-            </a:r>
-            <a:r>
-              <a:rPr lang="en-US" dirty="0" smtClean="0"/>
-              <a:t>out” external dependencies (e.g. databases)</a:t>
+              <a:t> out” external dependencies (e.g. databases)</a:t>
             </a:r>
           </a:p>
           <a:p>
@@ -19714,8 +19710,27 @@
           <a:p>
             <a:r>
               <a:rPr lang="en-US" dirty="0" smtClean="0"/>
-              <a:t>Stubs, mocks, and fakes in unit tests are only possible when we have an interface to implement</a:t>
-            </a:r>
+              <a:t>Stubs, mocks, and fakes in unit tests are only possible when we have an interface to </a:t>
+            </a:r>
+            <a:r>
+              <a:rPr lang="en-US" dirty="0" smtClean="0"/>
+              <a:t>implement</a:t>
+            </a:r>
+            <a:br>
+              <a:rPr lang="en-US" dirty="0" smtClean="0"/>
+            </a:br>
+            <a:r>
+              <a:rPr lang="en-US" dirty="0" smtClean="0"/>
+              <a:t/>
+            </a:r>
+            <a:br>
+              <a:rPr lang="en-US" dirty="0" smtClean="0"/>
+            </a:br>
+            <a:r>
+              <a:rPr lang="en-US" b="1" i="1" dirty="0" smtClean="0"/>
+              <a:t>The reason for the Dependency Inversion Principle is to help us write unit tests.</a:t>
+            </a:r>
+            <a:endParaRPr lang="en-US" b="1" i="1" dirty="0" smtClean="0"/>
           </a:p>
           <a:p>
             <a:endParaRPr lang="en-US" dirty="0"/>
@@ -19756,7 +19771,7 @@
           <p:nvPr/>
         </p:nvPicPr>
         <p:blipFill>
-          <a:blip r:embed="rId2"/>
+          <a:blip r:embed="rId2" cstate="print"/>
           <a:srcRect/>
           <a:stretch>
             <a:fillRect/>
@@ -22223,7 +22238,7 @@
         <p:spPr>
           <a:xfrm>
             <a:off x="609600" y="1752600"/>
-            <a:ext cx="8001000" cy="1477328"/>
+            <a:ext cx="8001000" cy="1200329"/>
           </a:xfrm>
           <a:prstGeom prst="rect">
             <a:avLst/>
@@ -22277,7 +22292,7 @@
                 <a:latin typeface="Courier New" pitchFamily="49" charset="0"/>
                 <a:cs typeface="Courier New" pitchFamily="49" charset="0"/>
               </a:rPr>
-              <a:t>x.ForRequestedType</a:t>
+              <a:t>x.For</a:t>
             </a:r>
             <a:r>
               <a:rPr lang="en-US" b="1" dirty="0" smtClean="0">
@@ -22298,30 +22313,7 @@
                 <a:latin typeface="Courier New" pitchFamily="49" charset="0"/>
                 <a:cs typeface="Courier New" pitchFamily="49" charset="0"/>
               </a:rPr>
-              <a:t>&gt;()</a:t>
-            </a:r>
-          </a:p>
-          <a:p>
-            <a:r>
-              <a:rPr lang="en-US" b="1" dirty="0" smtClean="0">
-                <a:latin typeface="Courier New" pitchFamily="49" charset="0"/>
-                <a:cs typeface="Courier New" pitchFamily="49" charset="0"/>
-              </a:rPr>
-              <a:t>     .</a:t>
-            </a:r>
-            <a:r>
-              <a:rPr lang="en-US" b="1" dirty="0" err="1" smtClean="0">
-                <a:latin typeface="Courier New" pitchFamily="49" charset="0"/>
-                <a:cs typeface="Courier New" pitchFamily="49" charset="0"/>
-              </a:rPr>
-              <a:t>TheDefaultIsConcreteType</a:t>
-            </a:r>
-            <a:r>
-              <a:rPr lang="en-US" b="1" dirty="0" smtClean="0">
-                <a:latin typeface="Courier New" pitchFamily="49" charset="0"/>
-                <a:cs typeface="Courier New" pitchFamily="49" charset="0"/>
-              </a:rPr>
-              <a:t>&lt;</a:t>
+              <a:t>&gt;().Use&lt;</a:t>
             </a:r>
             <a:r>
               <a:rPr lang="en-US" b="1" dirty="0" err="1" smtClean="0">
@@ -22865,7 +22857,7 @@
                 <a:latin typeface="Courier New" pitchFamily="49" charset="0"/>
                 <a:cs typeface="Courier New" pitchFamily="49" charset="0"/>
               </a:rPr>
-              <a:t>x.ForRequestedType</a:t>
+              <a:t>x.For</a:t>
             </a:r>
             <a:r>
               <a:rPr lang="en-US" b="1" dirty="0" smtClean="0">
@@ -22895,21 +22887,14 @@
                 <a:latin typeface="Courier New" pitchFamily="49" charset="0"/>
                 <a:cs typeface="Courier New" pitchFamily="49" charset="0"/>
               </a:rPr>
-              <a:t>     .</a:t>
-            </a:r>
-            <a:r>
-              <a:rPr lang="en-US" b="1" dirty="0" err="1" smtClean="0">
-                <a:latin typeface="Courier New" pitchFamily="49" charset="0"/>
-                <a:cs typeface="Courier New" pitchFamily="49" charset="0"/>
-              </a:rPr>
-              <a:t>TheDefaultIsConcreteType</a:t>
+              <a:t>     </a:t>
             </a:r>
             <a:r>
               <a:rPr lang="en-US" b="1" dirty="0" smtClean="0">
                 <a:latin typeface="Courier New" pitchFamily="49" charset="0"/>
                 <a:cs typeface="Courier New" pitchFamily="49" charset="0"/>
               </a:rPr>
-              <a:t>&lt;</a:t>
+              <a:t>.Use&lt;</a:t>
             </a:r>
             <a:r>
               <a:rPr lang="en-US" b="1" dirty="0" err="1" smtClean="0">
@@ -23170,7 +23155,7 @@
         <p:spPr>
           <a:xfrm>
             <a:off x="609600" y="1752600"/>
-            <a:ext cx="8229600" cy="1754326"/>
+            <a:ext cx="8229600" cy="1200329"/>
           </a:xfrm>
           <a:prstGeom prst="rect">
             <a:avLst/>
@@ -23224,7 +23209,7 @@
                 <a:latin typeface="Courier New" pitchFamily="49" charset="0"/>
                 <a:cs typeface="Courier New" pitchFamily="49" charset="0"/>
               </a:rPr>
-              <a:t>x.ForRequestedType</a:t>
+              <a:t>x.ForSingletonOf</a:t>
             </a:r>
             <a:r>
               <a:rPr lang="en-US" b="1" dirty="0" smtClean="0">
@@ -23245,81 +23230,26 @@
                 <a:latin typeface="Courier New" pitchFamily="49" charset="0"/>
                 <a:cs typeface="Courier New" pitchFamily="49" charset="0"/>
               </a:rPr>
-              <a:t>&gt;()</a:t>
-            </a:r>
-          </a:p>
-          <a:p>
+              <a:t>&gt;().Use&lt;</a:t>
+            </a:r>
+            <a:r>
+              <a:rPr lang="en-US" b="1" dirty="0" err="1" smtClean="0">
+                <a:latin typeface="Courier New" pitchFamily="49" charset="0"/>
+                <a:cs typeface="Courier New" pitchFamily="49" charset="0"/>
+              </a:rPr>
+              <a:t>ProductCache</a:t>
+            </a:r>
             <a:r>
               <a:rPr lang="en-US" b="1" dirty="0" smtClean="0">
                 <a:latin typeface="Courier New" pitchFamily="49" charset="0"/>
                 <a:cs typeface="Courier New" pitchFamily="49" charset="0"/>
               </a:rPr>
-              <a:t>     .</a:t>
-            </a:r>
-            <a:r>
-              <a:rPr lang="en-US" b="1" dirty="0" err="1" smtClean="0">
-                <a:latin typeface="Courier New" pitchFamily="49" charset="0"/>
-                <a:cs typeface="Courier New" pitchFamily="49" charset="0"/>
-              </a:rPr>
-              <a:t>TheDefaultIsConcreteType</a:t>
-            </a:r>
-            <a:r>
-              <a:rPr lang="en-US" b="1" dirty="0" smtClean="0">
-                <a:latin typeface="Courier New" pitchFamily="49" charset="0"/>
-                <a:cs typeface="Courier New" pitchFamily="49" charset="0"/>
-              </a:rPr>
-              <a:t>&lt;</a:t>
-            </a:r>
-            <a:r>
-              <a:rPr lang="en-US" b="1" dirty="0" err="1" smtClean="0">
-                <a:latin typeface="Courier New" pitchFamily="49" charset="0"/>
-                <a:cs typeface="Courier New" pitchFamily="49" charset="0"/>
-              </a:rPr>
-              <a:t>ProductCache</a:t>
-            </a:r>
-            <a:r>
-              <a:rPr lang="en-US" b="1" dirty="0" smtClean="0">
-                <a:latin typeface="Courier New" pitchFamily="49" charset="0"/>
-                <a:cs typeface="Courier New" pitchFamily="49" charset="0"/>
-              </a:rPr>
-              <a:t>&gt;()</a:t>
-            </a:r>
-          </a:p>
-          <a:p>
-            <a:r>
-              <a:rPr lang="en-US" b="1" dirty="0" smtClean="0">
-                <a:latin typeface="Courier New" pitchFamily="49" charset="0"/>
-                <a:cs typeface="Courier New" pitchFamily="49" charset="0"/>
-              </a:rPr>
-              <a:t>     .</a:t>
-            </a:r>
-            <a:r>
-              <a:rPr lang="en-US" b="1" dirty="0" err="1" smtClean="0">
-                <a:solidFill>
-                  <a:srgbClr val="FF0000"/>
-                </a:solidFill>
-                <a:latin typeface="Courier New" pitchFamily="49" charset="0"/>
-                <a:cs typeface="Courier New" pitchFamily="49" charset="0"/>
-              </a:rPr>
-              <a:t>AsSingletons</a:t>
-            </a:r>
-            <a:r>
-              <a:rPr lang="en-US" b="1" dirty="0" smtClean="0">
-                <a:solidFill>
-                  <a:srgbClr val="FF0000"/>
-                </a:solidFill>
-                <a:latin typeface="Courier New" pitchFamily="49" charset="0"/>
-                <a:cs typeface="Courier New" pitchFamily="49" charset="0"/>
-              </a:rPr>
-              <a:t>()</a:t>
-            </a:r>
-            <a:r>
-              <a:rPr lang="en-US" b="1" dirty="0" smtClean="0">
-                <a:latin typeface="Courier New" pitchFamily="49" charset="0"/>
-                <a:cs typeface="Courier New" pitchFamily="49" charset="0"/>
-              </a:rPr>
-              <a:t>;</a:t>
-            </a:r>
+              <a:t>&gt;();</a:t>
+            </a:r>
+            <a:endParaRPr lang="en-US" b="1" dirty="0" smtClean="0">
+              <a:latin typeface="Courier New" pitchFamily="49" charset="0"/>
+              <a:cs typeface="Courier New" pitchFamily="49" charset="0"/>
+            </a:endParaRPr>
           </a:p>
           <a:p>
             <a:r>
@@ -23381,19 +23311,19 @@
         <p:spPr/>
         <p:txBody>
           <a:bodyPr>
-            <a:normAutofit fontScale="90000"/>
+            <a:noAutofit/>
           </a:bodyPr>
           <a:lstStyle/>
           <a:p>
             <a:r>
-              <a:rPr lang="en-US" dirty="0" err="1" smtClean="0"/>
-              <a:t>StructureMap</a:t>
-            </a:r>
-            <a:r>
-              <a:rPr lang="en-US" dirty="0" smtClean="0"/>
-              <a:t> – Object Lifetimes</a:t>
-            </a:r>
-            <a:endParaRPr lang="en-US" dirty="0"/>
+              <a:rPr lang="en-US" sz="3600" dirty="0" smtClean="0"/>
+              <a:t>StructureMap – </a:t>
+            </a:r>
+            <a:r>
+              <a:rPr lang="en-US" sz="3600" dirty="0" smtClean="0"/>
+              <a:t>Custom Construction</a:t>
+            </a:r>
+            <a:endParaRPr lang="en-US" sz="3600" dirty="0"/>
           </a:p>
         </p:txBody>
       </p:sp>
@@ -23420,18 +23350,12 @@
           <a:lstStyle/>
           <a:p>
             <a:r>
-              <a:rPr lang="en-US" b="1" dirty="0" err="1" smtClean="0"/>
-              <a:t>InstanceScope.Hybrid</a:t>
-            </a:r>
-            <a:r>
               <a:rPr lang="en-US" dirty="0" smtClean="0"/>
-              <a:t> means that we will only have one of these objects per request (web) or thread (in our tests)</a:t>
-            </a:r>
-          </a:p>
-          <a:p>
+              <a:t>Testing </a:t>
+            </a:r>
             <a:r>
               <a:rPr lang="en-US" dirty="0" smtClean="0"/>
-              <a:t>Testing will be easier because we won’t reference </a:t>
+              <a:t>will be easier because we won’t reference </a:t>
             </a:r>
             <a:r>
               <a:rPr lang="en-US" dirty="0" err="1" smtClean="0"/>
@@ -23450,7 +23374,7 @@
         <p:spPr>
           <a:xfrm>
             <a:off x="609600" y="1752600"/>
-            <a:ext cx="8229600" cy="2031325"/>
+            <a:ext cx="8229600" cy="1477328"/>
           </a:xfrm>
           <a:prstGeom prst="rect">
             <a:avLst/>
@@ -23504,7 +23428,7 @@
                 <a:latin typeface="Courier New" pitchFamily="49" charset="0"/>
                 <a:cs typeface="Courier New" pitchFamily="49" charset="0"/>
               </a:rPr>
-              <a:t>x.ForRequestedType</a:t>
+              <a:t>x.For</a:t>
             </a:r>
             <a:r>
               <a:rPr lang="en-US" b="1" dirty="0" smtClean="0">
@@ -23534,67 +23458,21 @@
                 <a:latin typeface="Courier New" pitchFamily="49" charset="0"/>
                 <a:cs typeface="Courier New" pitchFamily="49" charset="0"/>
               </a:rPr>
-              <a:t>     .</a:t>
-            </a:r>
-            <a:r>
-              <a:rPr lang="en-US" b="1" dirty="0" err="1" smtClean="0">
-                <a:latin typeface="Courier New" pitchFamily="49" charset="0"/>
-                <a:cs typeface="Courier New" pitchFamily="49" charset="0"/>
-              </a:rPr>
-              <a:t>CacheBy</a:t>
+              <a:t> </a:t>
             </a:r>
             <a:r>
               <a:rPr lang="en-US" b="1" dirty="0" smtClean="0">
                 <a:latin typeface="Courier New" pitchFamily="49" charset="0"/>
                 <a:cs typeface="Courier New" pitchFamily="49" charset="0"/>
               </a:rPr>
-              <a:t>(</a:t>
-            </a:r>
-            <a:r>
-              <a:rPr lang="en-US" b="1" dirty="0" err="1" smtClean="0">
-                <a:latin typeface="Courier New" pitchFamily="49" charset="0"/>
-                <a:cs typeface="Courier New" pitchFamily="49" charset="0"/>
-              </a:rPr>
-              <a:t>InstanceScope.Hybrid</a:t>
+              <a:t>    </a:t>
             </a:r>
             <a:r>
               <a:rPr lang="en-US" b="1" dirty="0" smtClean="0">
                 <a:latin typeface="Courier New" pitchFamily="49" charset="0"/>
                 <a:cs typeface="Courier New" pitchFamily="49" charset="0"/>
               </a:rPr>
-              <a:t>) </a:t>
-            </a:r>
-          </a:p>
-          <a:p>
-            <a:r>
-              <a:rPr lang="en-US" b="1" dirty="0" smtClean="0">
-                <a:latin typeface="Courier New" pitchFamily="49" charset="0"/>
-                <a:cs typeface="Courier New" pitchFamily="49" charset="0"/>
-              </a:rPr>
-              <a:t>     .</a:t>
-            </a:r>
-            <a:r>
-              <a:rPr lang="en-US" b="1" dirty="0" err="1" smtClean="0">
-                <a:latin typeface="Courier New" pitchFamily="49" charset="0"/>
-                <a:cs typeface="Courier New" pitchFamily="49" charset="0"/>
-              </a:rPr>
-              <a:t>TheDefault.Is.ConstructedBy</a:t>
-            </a:r>
-            <a:r>
-              <a:rPr lang="en-US" b="1" dirty="0" smtClean="0">
-                <a:latin typeface="Courier New" pitchFamily="49" charset="0"/>
-                <a:cs typeface="Courier New" pitchFamily="49" charset="0"/>
-              </a:rPr>
-              <a:t>(</a:t>
-            </a:r>
-          </a:p>
-          <a:p>
-            <a:r>
-              <a:rPr lang="en-US" b="1" dirty="0" smtClean="0">
-                <a:latin typeface="Courier New" pitchFamily="49" charset="0"/>
-                <a:cs typeface="Courier New" pitchFamily="49" charset="0"/>
-              </a:rPr>
-              <a:t>        c =&gt; new </a:t>
+              <a:t>.Use(c =&gt; new </a:t>
             </a:r>
             <a:r>
               <a:rPr lang="en-US" b="1" dirty="0" err="1" smtClean="0">
@@ -25299,7 +25177,7 @@
           <p:nvPr/>
         </p:nvPicPr>
         <p:blipFill>
-          <a:blip r:embed="rId2"/>
+          <a:blip r:embed="rId2" cstate="print"/>
           <a:srcRect/>
           <a:stretch>
             <a:fillRect/>
@@ -25388,7 +25266,7 @@
           </p:nvPr>
         </p:nvPicPr>
         <p:blipFill>
-          <a:blip r:embed="rId2"/>
+          <a:blip r:embed="rId2" cstate="print"/>
           <a:stretch>
             <a:fillRect/>
           </a:stretch>

</xml_diff>

<commit_message>
modifications for SWE 101 in Nashville
</commit_message>
<xml_diff>
--- a/SOLID Software Design Principles - without small methods.pptx
+++ b/SOLID Software Design Principles - without small methods.pptx
@@ -73,9 +73,9 @@
     <p:sldId id="312" r:id="rId64"/>
     <p:sldId id="314" r:id="rId65"/>
     <p:sldId id="315" r:id="rId66"/>
-    <p:sldId id="323" r:id="rId67"/>
-    <p:sldId id="319" r:id="rId68"/>
-    <p:sldId id="341" r:id="rId69"/>
+    <p:sldId id="341" r:id="rId67"/>
+    <p:sldId id="323" r:id="rId68"/>
+    <p:sldId id="319" r:id="rId69"/>
     <p:sldId id="350" r:id="rId70"/>
     <p:sldId id="351" r:id="rId71"/>
     <p:sldId id="352" r:id="rId72"/>
@@ -2027,7 +2027,7 @@
             <a:fld id="{46B52E04-8F68-435C-880A-7C7B12D9BA2F}" type="slidenum">
               <a:rPr lang="en-US" smtClean="0"/>
               <a:pPr/>
-              <a:t>67</a:t>
+              <a:t>68</a:t>
             </a:fld>
             <a:endParaRPr lang="en-US"/>
           </a:p>
@@ -2690,14 +2690,6 @@
           </a:bodyPr>
           <a:lstStyle/>
           <a:p>
-            <a:r>
-              <a:rPr lang="en-US" dirty="0" smtClean="0"/>
-              <a:t>- Account doesn’t know</a:t>
-            </a:r>
-            <a:r>
-              <a:rPr lang="en-US" baseline="0" dirty="0" smtClean="0"/>
-              <a:t> anything about who holds the account</a:t>
-            </a:r>
             <a:endParaRPr lang="en-US" dirty="0"/>
           </a:p>
         </p:txBody>
@@ -8073,7 +8065,7 @@
         <p:spPr>
           <a:xfrm>
             <a:off x="457200" y="1600200"/>
-            <a:ext cx="8229600" cy="4495800"/>
+            <a:ext cx="8229600" cy="4724400"/>
           </a:xfrm>
           <a:solidFill>
             <a:schemeClr val="bg1">
@@ -8155,6 +8147,46 @@
                 <a:cs typeface="Courier New" pitchFamily="49" charset="0"/>
               </a:rPr>
               <a:t>    public decimal Balance { get; set; }</a:t>
+            </a:r>
+          </a:p>
+          <a:p>
+            <a:pPr>
+              <a:buNone/>
+            </a:pPr>
+            <a:r>
+              <a:rPr lang="en-US" sz="1500" b="1" dirty="0" smtClean="0">
+                <a:latin typeface="Courier New" pitchFamily="49" charset="0"/>
+                <a:cs typeface="Courier New" pitchFamily="49" charset="0"/>
+              </a:rPr>
+              <a:t>    public </a:t>
+            </a:r>
+            <a:r>
+              <a:rPr lang="en-US" sz="1500" b="1" dirty="0" err="1" smtClean="0">
+                <a:latin typeface="Courier New" pitchFamily="49" charset="0"/>
+                <a:cs typeface="Courier New" pitchFamily="49" charset="0"/>
+              </a:rPr>
+              <a:t>IList</a:t>
+            </a:r>
+            <a:r>
+              <a:rPr lang="en-US" sz="1500" b="1" dirty="0" smtClean="0">
+                <a:latin typeface="Courier New" pitchFamily="49" charset="0"/>
+                <a:cs typeface="Courier New" pitchFamily="49" charset="0"/>
+              </a:rPr>
+              <a:t>&lt;Person&gt; </a:t>
+            </a:r>
+            <a:r>
+              <a:rPr lang="en-US" sz="1500" b="1" dirty="0" err="1" smtClean="0">
+                <a:latin typeface="Courier New" pitchFamily="49" charset="0"/>
+                <a:cs typeface="Courier New" pitchFamily="49" charset="0"/>
+              </a:rPr>
+              <a:t>AccountHolders</a:t>
+            </a:r>
+            <a:r>
+              <a:rPr lang="en-US" sz="1500" b="1" dirty="0" smtClean="0">
+                <a:latin typeface="Courier New" pitchFamily="49" charset="0"/>
+                <a:cs typeface="Courier New" pitchFamily="49" charset="0"/>
+              </a:rPr>
+              <a:t> { get; set; }</a:t>
             </a:r>
           </a:p>
           <a:p>
@@ -20213,15 +20245,7 @@
             </a:br>
             <a:r>
               <a:rPr lang="en-US" b="1" i="1" dirty="0" smtClean="0"/>
-              <a:t>The </a:t>
-            </a:r>
-            <a:r>
-              <a:rPr lang="en-US" b="1" i="1" dirty="0" smtClean="0"/>
-              <a:t>main reason </a:t>
-            </a:r>
-            <a:r>
-              <a:rPr lang="en-US" b="1" i="1" dirty="0" smtClean="0"/>
-              <a:t>for the Dependency Inversion Principle is to help us write unit tests.</a:t>
+              <a:t>The main reason for the Dependency Inversion Principle is to help us write unit tests.</a:t>
             </a:r>
           </a:p>
           <a:p>
@@ -20234,6 +20258,13 @@
   <p:clrMapOvr>
     <a:masterClrMapping/>
   </p:clrMapOvr>
+  <p:timing>
+    <p:tnLst>
+      <p:par>
+        <p:cTn id="1" dur="indefinite" restart="never" nodeType="tmRoot"/>
+      </p:par>
+    </p:tnLst>
+  </p:timing>
 </p:sld>
 </file>
 
@@ -21274,7 +21305,7 @@
         <p:spPr>
           <a:xfrm>
             <a:off x="609600" y="2514600"/>
-            <a:ext cx="8077200" cy="1200329"/>
+            <a:ext cx="8077200" cy="2031325"/>
           </a:xfrm>
           <a:prstGeom prst="rect">
             <a:avLst/>
@@ -21332,14 +21363,41 @@
                 <a:latin typeface="Courier New" pitchFamily="49" charset="0"/>
                 <a:cs typeface="Courier New" pitchFamily="49" charset="0"/>
               </a:rPr>
-              <a:t>CurrentUser</a:t>
+              <a:t>GetCurrentUser</a:t>
             </a:r>
             <a:r>
               <a:rPr lang="en-US" b="1" dirty="0" smtClean="0">
                 <a:latin typeface="Courier New" pitchFamily="49" charset="0"/>
                 <a:cs typeface="Courier New" pitchFamily="49" charset="0"/>
               </a:rPr>
-              <a:t> { get; set; }</a:t>
+              <a:t>()</a:t>
+            </a:r>
+          </a:p>
+          <a:p>
+            <a:r>
+              <a:rPr lang="en-US" b="1" dirty="0" smtClean="0">
+                <a:latin typeface="Courier New" pitchFamily="49" charset="0"/>
+                <a:cs typeface="Courier New" pitchFamily="49" charset="0"/>
+              </a:rPr>
+              <a:t>    {</a:t>
+            </a:r>
+          </a:p>
+          <a:p>
+            <a:r>
+              <a:rPr lang="en-US" b="1" dirty="0" smtClean="0">
+                <a:latin typeface="Courier New" pitchFamily="49" charset="0"/>
+                <a:cs typeface="Courier New" pitchFamily="49" charset="0"/>
+              </a:rPr>
+              <a:t>        // do something</a:t>
+            </a:r>
+          </a:p>
+          <a:p>
+            <a:r>
+              <a:rPr lang="en-US" b="1" dirty="0" smtClean="0">
+                <a:latin typeface="Courier New" pitchFamily="49" charset="0"/>
+                <a:cs typeface="Courier New" pitchFamily="49" charset="0"/>
+              </a:rPr>
+              <a:t>    }</a:t>
             </a:r>
           </a:p>
           <a:p>
@@ -21591,6 +21649,34 @@
           </a:p>
         </p:txBody>
       </p:sp>
+      <p:sp>
+        <p:nvSpPr>
+          <p:cNvPr id="6" name="Rectangle 5"/>
+          <p:cNvSpPr/>
+          <p:nvPr/>
+        </p:nvSpPr>
+        <p:spPr>
+          <a:xfrm>
+            <a:off x="3854496" y="3244334"/>
+            <a:ext cx="1435008" cy="369332"/>
+          </a:xfrm>
+          <a:prstGeom prst="rect">
+            <a:avLst/>
+          </a:prstGeom>
+        </p:spPr>
+        <p:txBody>
+          <a:bodyPr wrap="none">
+            <a:spAutoFit/>
+          </a:bodyPr>
+          <a:lstStyle/>
+          <a:p>
+            <a:r>
+              <a:rPr lang="en-US" dirty="0" smtClean="0"/>
+              <a:t> return order</a:t>
+            </a:r>
+          </a:p>
+        </p:txBody>
+      </p:sp>
     </p:spTree>
   </p:cSld>
   <p:clrMapOvr>
@@ -21607,6 +21693,465 @@
 </file>
 
 <file path=ppt/slides/slide66.xml><?xml version="1.0" encoding="utf-8"?>
+<p:sld xmlns:a="http://schemas.openxmlformats.org/drawingml/2006/main" xmlns:r="http://schemas.openxmlformats.org/officeDocument/2006/relationships" xmlns:p="http://schemas.openxmlformats.org/presentationml/2006/main">
+  <p:cSld>
+    <p:spTree>
+      <p:nvGrpSpPr>
+        <p:cNvPr id="1" name=""/>
+        <p:cNvGrpSpPr/>
+        <p:nvPr/>
+      </p:nvGrpSpPr>
+      <p:grpSpPr>
+        <a:xfrm>
+          <a:off x="0" y="0"/>
+          <a:ext cx="0" cy="0"/>
+          <a:chOff x="0" y="0"/>
+          <a:chExt cx="0" cy="0"/>
+        </a:xfrm>
+      </p:grpSpPr>
+      <p:sp>
+        <p:nvSpPr>
+          <p:cNvPr id="2" name="Title 1"/>
+          <p:cNvSpPr>
+            <a:spLocks noGrp="1"/>
+          </p:cNvSpPr>
+          <p:nvPr>
+            <p:ph type="title"/>
+          </p:nvPr>
+        </p:nvSpPr>
+        <p:spPr/>
+        <p:txBody>
+          <a:bodyPr>
+            <a:normAutofit fontScale="90000"/>
+          </a:bodyPr>
+          <a:lstStyle/>
+          <a:p>
+            <a:r>
+              <a:rPr lang="en-US" dirty="0" smtClean="0"/>
+              <a:t>Enabling DIP – </a:t>
+            </a:r>
+            <a:r>
+              <a:rPr lang="en-US" dirty="0"/>
+              <a:t>C</a:t>
+            </a:r>
+            <a:r>
+              <a:rPr lang="en-US" dirty="0" smtClean="0"/>
+              <a:t>onstructor </a:t>
+            </a:r>
+            <a:r>
+              <a:rPr lang="en-US" dirty="0"/>
+              <a:t>I</a:t>
+            </a:r>
+            <a:r>
+              <a:rPr lang="en-US" dirty="0" smtClean="0"/>
+              <a:t>njection</a:t>
+            </a:r>
+            <a:endParaRPr lang="en-US" dirty="0"/>
+          </a:p>
+        </p:txBody>
+      </p:sp>
+      <p:sp>
+        <p:nvSpPr>
+          <p:cNvPr id="4" name="TextBox 3"/>
+          <p:cNvSpPr txBox="1"/>
+          <p:nvPr/>
+        </p:nvSpPr>
+        <p:spPr>
+          <a:xfrm>
+            <a:off x="609600" y="1600200"/>
+            <a:ext cx="8077200" cy="4524315"/>
+          </a:xfrm>
+          <a:prstGeom prst="rect">
+            <a:avLst/>
+          </a:prstGeom>
+          <a:solidFill>
+            <a:schemeClr val="bg1">
+              <a:lumMod val="85000"/>
+            </a:schemeClr>
+          </a:solidFill>
+        </p:spPr>
+        <p:txBody>
+          <a:bodyPr wrap="square" rtlCol="0">
+            <a:spAutoFit/>
+          </a:bodyPr>
+          <a:lstStyle/>
+          <a:p>
+            <a:r>
+              <a:rPr lang="en-US" b="1" dirty="0" smtClean="0">
+                <a:latin typeface="Courier New" pitchFamily="49" charset="0"/>
+                <a:cs typeface="Courier New" pitchFamily="49" charset="0"/>
+              </a:rPr>
+              <a:t>public class </a:t>
+            </a:r>
+            <a:r>
+              <a:rPr lang="en-US" b="1" dirty="0" err="1" smtClean="0">
+                <a:latin typeface="Courier New" pitchFamily="49" charset="0"/>
+                <a:cs typeface="Courier New" pitchFamily="49" charset="0"/>
+              </a:rPr>
+              <a:t>GetProductService</a:t>
+            </a:r>
+            <a:r>
+              <a:rPr lang="en-US" b="1" dirty="0" smtClean="0">
+                <a:latin typeface="Courier New" pitchFamily="49" charset="0"/>
+                <a:cs typeface="Courier New" pitchFamily="49" charset="0"/>
+              </a:rPr>
+              <a:t> : </a:t>
+            </a:r>
+            <a:r>
+              <a:rPr lang="en-US" b="1" dirty="0" err="1" smtClean="0">
+                <a:solidFill>
+                  <a:srgbClr val="FF0000"/>
+                </a:solidFill>
+                <a:latin typeface="Courier New" pitchFamily="49" charset="0"/>
+                <a:cs typeface="Courier New" pitchFamily="49" charset="0"/>
+              </a:rPr>
+              <a:t>IGetProductService</a:t>
+            </a:r>
+            <a:endParaRPr lang="en-US" b="1" dirty="0" smtClean="0">
+              <a:solidFill>
+                <a:srgbClr val="FF0000"/>
+              </a:solidFill>
+              <a:latin typeface="Courier New" pitchFamily="49" charset="0"/>
+              <a:cs typeface="Courier New" pitchFamily="49" charset="0"/>
+            </a:endParaRPr>
+          </a:p>
+          <a:p>
+            <a:r>
+              <a:rPr lang="en-US" b="1" dirty="0" smtClean="0">
+                <a:latin typeface="Courier New" pitchFamily="49" charset="0"/>
+                <a:cs typeface="Courier New" pitchFamily="49" charset="0"/>
+              </a:rPr>
+              <a:t>{</a:t>
+            </a:r>
+          </a:p>
+          <a:p>
+            <a:r>
+              <a:rPr lang="en-US" b="1" dirty="0" smtClean="0">
+                <a:latin typeface="Courier New" pitchFamily="49" charset="0"/>
+                <a:cs typeface="Courier New" pitchFamily="49" charset="0"/>
+              </a:rPr>
+              <a:t>    private </a:t>
+            </a:r>
+            <a:r>
+              <a:rPr lang="en-US" b="1" dirty="0" err="1" smtClean="0">
+                <a:latin typeface="Courier New" pitchFamily="49" charset="0"/>
+                <a:cs typeface="Courier New" pitchFamily="49" charset="0"/>
+              </a:rPr>
+              <a:t>IProductRepository</a:t>
+            </a:r>
+            <a:r>
+              <a:rPr lang="en-US" b="1" dirty="0" smtClean="0">
+                <a:latin typeface="Courier New" pitchFamily="49" charset="0"/>
+                <a:cs typeface="Courier New" pitchFamily="49" charset="0"/>
+              </a:rPr>
+              <a:t> _</a:t>
+            </a:r>
+            <a:r>
+              <a:rPr lang="en-US" b="1" dirty="0" err="1" smtClean="0">
+                <a:latin typeface="Courier New" pitchFamily="49" charset="0"/>
+                <a:cs typeface="Courier New" pitchFamily="49" charset="0"/>
+              </a:rPr>
+              <a:t>productRepository</a:t>
+            </a:r>
+            <a:r>
+              <a:rPr lang="en-US" b="1" dirty="0" smtClean="0">
+                <a:latin typeface="Courier New" pitchFamily="49" charset="0"/>
+                <a:cs typeface="Courier New" pitchFamily="49" charset="0"/>
+              </a:rPr>
+              <a:t>;</a:t>
+            </a:r>
+          </a:p>
+          <a:p>
+            <a:endParaRPr lang="en-US" b="1" dirty="0" smtClean="0">
+              <a:latin typeface="Courier New" pitchFamily="49" charset="0"/>
+              <a:cs typeface="Courier New" pitchFamily="49" charset="0"/>
+            </a:endParaRPr>
+          </a:p>
+          <a:p>
+            <a:r>
+              <a:rPr lang="en-US" b="1" dirty="0" smtClean="0">
+                <a:latin typeface="Courier New" pitchFamily="49" charset="0"/>
+                <a:cs typeface="Courier New" pitchFamily="49" charset="0"/>
+              </a:rPr>
+              <a:t>    public </a:t>
+            </a:r>
+            <a:r>
+              <a:rPr lang="en-US" b="1" dirty="0" err="1" smtClean="0">
+                <a:latin typeface="Courier New" pitchFamily="49" charset="0"/>
+                <a:cs typeface="Courier New" pitchFamily="49" charset="0"/>
+              </a:rPr>
+              <a:t>GetProductService</a:t>
+            </a:r>
+            <a:r>
+              <a:rPr lang="en-US" b="1" dirty="0" smtClean="0">
+                <a:latin typeface="Courier New" pitchFamily="49" charset="0"/>
+                <a:cs typeface="Courier New" pitchFamily="49" charset="0"/>
+              </a:rPr>
+              <a:t>(</a:t>
+            </a:r>
+          </a:p>
+          <a:p>
+            <a:r>
+              <a:rPr lang="en-US" b="1" dirty="0" smtClean="0">
+                <a:latin typeface="Courier New" pitchFamily="49" charset="0"/>
+                <a:cs typeface="Courier New" pitchFamily="49" charset="0"/>
+              </a:rPr>
+              <a:t>        </a:t>
+            </a:r>
+            <a:r>
+              <a:rPr lang="en-US" b="1" dirty="0" err="1" smtClean="0">
+                <a:solidFill>
+                  <a:srgbClr val="FF0000"/>
+                </a:solidFill>
+                <a:latin typeface="Courier New" pitchFamily="49" charset="0"/>
+                <a:cs typeface="Courier New" pitchFamily="49" charset="0"/>
+              </a:rPr>
+              <a:t>IProductRepository</a:t>
+            </a:r>
+            <a:r>
+              <a:rPr lang="en-US" b="1" dirty="0" smtClean="0">
+                <a:solidFill>
+                  <a:srgbClr val="FF0000"/>
+                </a:solidFill>
+                <a:latin typeface="Courier New" pitchFamily="49" charset="0"/>
+                <a:cs typeface="Courier New" pitchFamily="49" charset="0"/>
+              </a:rPr>
+              <a:t> </a:t>
+            </a:r>
+            <a:r>
+              <a:rPr lang="en-US" b="1" dirty="0" err="1" smtClean="0">
+                <a:solidFill>
+                  <a:srgbClr val="FF0000"/>
+                </a:solidFill>
+                <a:latin typeface="Courier New" pitchFamily="49" charset="0"/>
+                <a:cs typeface="Courier New" pitchFamily="49" charset="0"/>
+              </a:rPr>
+              <a:t>productRepository</a:t>
+            </a:r>
+            <a:r>
+              <a:rPr lang="en-US" b="1" dirty="0" smtClean="0">
+                <a:latin typeface="Courier New" pitchFamily="49" charset="0"/>
+                <a:cs typeface="Courier New" pitchFamily="49" charset="0"/>
+              </a:rPr>
+              <a:t>)</a:t>
+            </a:r>
+          </a:p>
+          <a:p>
+            <a:r>
+              <a:rPr lang="en-US" b="1" dirty="0" smtClean="0">
+                <a:latin typeface="Courier New" pitchFamily="49" charset="0"/>
+                <a:cs typeface="Courier New" pitchFamily="49" charset="0"/>
+              </a:rPr>
+              <a:t>    {</a:t>
+            </a:r>
+          </a:p>
+          <a:p>
+            <a:r>
+              <a:rPr lang="en-US" b="1" dirty="0" smtClean="0">
+                <a:latin typeface="Courier New" pitchFamily="49" charset="0"/>
+                <a:cs typeface="Courier New" pitchFamily="49" charset="0"/>
+              </a:rPr>
+              <a:t>        _</a:t>
+            </a:r>
+            <a:r>
+              <a:rPr lang="en-US" b="1" dirty="0" err="1" smtClean="0">
+                <a:latin typeface="Courier New" pitchFamily="49" charset="0"/>
+                <a:cs typeface="Courier New" pitchFamily="49" charset="0"/>
+              </a:rPr>
+              <a:t>productRepository</a:t>
+            </a:r>
+            <a:r>
+              <a:rPr lang="en-US" b="1" dirty="0" smtClean="0">
+                <a:latin typeface="Courier New" pitchFamily="49" charset="0"/>
+                <a:cs typeface="Courier New" pitchFamily="49" charset="0"/>
+              </a:rPr>
+              <a:t> = </a:t>
+            </a:r>
+            <a:r>
+              <a:rPr lang="en-US" b="1" dirty="0" err="1" smtClean="0">
+                <a:latin typeface="Courier New" pitchFamily="49" charset="0"/>
+                <a:cs typeface="Courier New" pitchFamily="49" charset="0"/>
+              </a:rPr>
+              <a:t>productRepository</a:t>
+            </a:r>
+            <a:r>
+              <a:rPr lang="en-US" b="1" dirty="0" smtClean="0">
+                <a:latin typeface="Courier New" pitchFamily="49" charset="0"/>
+                <a:cs typeface="Courier New" pitchFamily="49" charset="0"/>
+              </a:rPr>
+              <a:t>;</a:t>
+            </a:r>
+          </a:p>
+          <a:p>
+            <a:r>
+              <a:rPr lang="en-US" b="1" dirty="0" smtClean="0">
+                <a:latin typeface="Courier New" pitchFamily="49" charset="0"/>
+                <a:cs typeface="Courier New" pitchFamily="49" charset="0"/>
+              </a:rPr>
+              <a:t>    }</a:t>
+            </a:r>
+          </a:p>
+          <a:p>
+            <a:endParaRPr lang="en-US" b="1" dirty="0" smtClean="0">
+              <a:latin typeface="Courier New" pitchFamily="49" charset="0"/>
+              <a:cs typeface="Courier New" pitchFamily="49" charset="0"/>
+            </a:endParaRPr>
+          </a:p>
+          <a:p>
+            <a:r>
+              <a:rPr lang="en-US" b="1" dirty="0" smtClean="0">
+                <a:latin typeface="Courier New" pitchFamily="49" charset="0"/>
+                <a:cs typeface="Courier New" pitchFamily="49" charset="0"/>
+              </a:rPr>
+              <a:t>    public </a:t>
+            </a:r>
+            <a:r>
+              <a:rPr lang="en-US" b="1" dirty="0" err="1" smtClean="0">
+                <a:latin typeface="Courier New" pitchFamily="49" charset="0"/>
+                <a:cs typeface="Courier New" pitchFamily="49" charset="0"/>
+              </a:rPr>
+              <a:t>IList</a:t>
+            </a:r>
+            <a:r>
+              <a:rPr lang="en-US" b="1" dirty="0" smtClean="0">
+                <a:latin typeface="Courier New" pitchFamily="49" charset="0"/>
+                <a:cs typeface="Courier New" pitchFamily="49" charset="0"/>
+              </a:rPr>
+              <a:t>&lt;Product&gt; </a:t>
+            </a:r>
+            <a:r>
+              <a:rPr lang="en-US" b="1" dirty="0" err="1" smtClean="0">
+                <a:latin typeface="Courier New" pitchFamily="49" charset="0"/>
+                <a:cs typeface="Courier New" pitchFamily="49" charset="0"/>
+              </a:rPr>
+              <a:t>GetProductById</a:t>
+            </a:r>
+            <a:r>
+              <a:rPr lang="en-US" b="1" dirty="0" smtClean="0">
+                <a:latin typeface="Courier New" pitchFamily="49" charset="0"/>
+                <a:cs typeface="Courier New" pitchFamily="49" charset="0"/>
+              </a:rPr>
+              <a:t>(</a:t>
+            </a:r>
+            <a:r>
+              <a:rPr lang="en-US" b="1" dirty="0" err="1" smtClean="0">
+                <a:latin typeface="Courier New" pitchFamily="49" charset="0"/>
+                <a:cs typeface="Courier New" pitchFamily="49" charset="0"/>
+              </a:rPr>
+              <a:t>int</a:t>
+            </a:r>
+            <a:r>
+              <a:rPr lang="en-US" b="1" dirty="0" smtClean="0">
+                <a:latin typeface="Courier New" pitchFamily="49" charset="0"/>
+                <a:cs typeface="Courier New" pitchFamily="49" charset="0"/>
+              </a:rPr>
+              <a:t> id)</a:t>
+            </a:r>
+          </a:p>
+          <a:p>
+            <a:r>
+              <a:rPr lang="en-US" b="1" dirty="0" smtClean="0">
+                <a:latin typeface="Courier New" pitchFamily="49" charset="0"/>
+                <a:cs typeface="Courier New" pitchFamily="49" charset="0"/>
+              </a:rPr>
+              <a:t>    {</a:t>
+            </a:r>
+          </a:p>
+          <a:p>
+            <a:r>
+              <a:rPr lang="en-US" b="1" dirty="0" smtClean="0">
+                <a:latin typeface="Courier New" pitchFamily="49" charset="0"/>
+                <a:cs typeface="Courier New" pitchFamily="49" charset="0"/>
+              </a:rPr>
+              <a:t>        return _</a:t>
+            </a:r>
+            <a:r>
+              <a:rPr lang="en-US" b="1" dirty="0" err="1" smtClean="0">
+                <a:latin typeface="Courier New" pitchFamily="49" charset="0"/>
+                <a:cs typeface="Courier New" pitchFamily="49" charset="0"/>
+              </a:rPr>
+              <a:t>productRepository.Get</a:t>
+            </a:r>
+            <a:r>
+              <a:rPr lang="en-US" b="1" dirty="0" smtClean="0">
+                <a:latin typeface="Courier New" pitchFamily="49" charset="0"/>
+                <a:cs typeface="Courier New" pitchFamily="49" charset="0"/>
+              </a:rPr>
+              <a:t>(id);</a:t>
+            </a:r>
+          </a:p>
+          <a:p>
+            <a:r>
+              <a:rPr lang="en-US" b="1" dirty="0" smtClean="0">
+                <a:latin typeface="Courier New" pitchFamily="49" charset="0"/>
+                <a:cs typeface="Courier New" pitchFamily="49" charset="0"/>
+              </a:rPr>
+              <a:t>    }</a:t>
+            </a:r>
+          </a:p>
+          <a:p>
+            <a:r>
+              <a:rPr lang="en-US" b="1" dirty="0" smtClean="0">
+                <a:latin typeface="Courier New" pitchFamily="49" charset="0"/>
+                <a:cs typeface="Courier New" pitchFamily="49" charset="0"/>
+              </a:rPr>
+              <a:t>}</a:t>
+            </a:r>
+          </a:p>
+          <a:p>
+            <a:endParaRPr lang="en-US" b="1" dirty="0">
+              <a:latin typeface="Courier New" pitchFamily="49" charset="0"/>
+              <a:cs typeface="Courier New" pitchFamily="49" charset="0"/>
+            </a:endParaRPr>
+          </a:p>
+        </p:txBody>
+      </p:sp>
+      <p:sp>
+        <p:nvSpPr>
+          <p:cNvPr id="5" name="TextBox 4"/>
+          <p:cNvSpPr txBox="1"/>
+          <p:nvPr/>
+        </p:nvSpPr>
+        <p:spPr>
+          <a:xfrm>
+            <a:off x="609600" y="6248400"/>
+            <a:ext cx="5588389" cy="461665"/>
+          </a:xfrm>
+          <a:prstGeom prst="rect">
+            <a:avLst/>
+          </a:prstGeom>
+          <a:noFill/>
+        </p:spPr>
+        <p:txBody>
+          <a:bodyPr wrap="none" rtlCol="0">
+            <a:spAutoFit/>
+          </a:bodyPr>
+          <a:lstStyle/>
+          <a:p>
+            <a:r>
+              <a:rPr lang="en-US" sz="2400" b="1" i="1" dirty="0" smtClean="0"/>
+              <a:t>Problem: How do we create these objects?</a:t>
+            </a:r>
+            <a:endParaRPr lang="en-US" sz="2400" b="1" i="1" dirty="0"/>
+          </a:p>
+        </p:txBody>
+      </p:sp>
+    </p:spTree>
+  </p:cSld>
+  <p:clrMapOvr>
+    <a:masterClrMapping/>
+  </p:clrMapOvr>
+  <p:timing>
+    <p:tnLst>
+      <p:par>
+        <p:cTn id="1" dur="indefinite" restart="never" nodeType="tmRoot"/>
+      </p:par>
+    </p:tnLst>
+  </p:timing>
+</p:sld>
+</file>
+
+<file path=ppt/slides/slide67.xml><?xml version="1.0" encoding="utf-8"?>
 <p:sld xmlns:a="http://schemas.openxmlformats.org/drawingml/2006/main" xmlns:r="http://schemas.openxmlformats.org/officeDocument/2006/relationships" xmlns:p="http://schemas.openxmlformats.org/presentationml/2006/main">
   <p:cSld>
     <p:spTree>
@@ -22038,152 +22583,6 @@
 </p:sld>
 </file>
 
-<file path=ppt/slides/slide67.xml><?xml version="1.0" encoding="utf-8"?>
-<p:sld xmlns:a="http://schemas.openxmlformats.org/drawingml/2006/main" xmlns:r="http://schemas.openxmlformats.org/officeDocument/2006/relationships" xmlns:p="http://schemas.openxmlformats.org/presentationml/2006/main">
-  <p:cSld>
-    <p:spTree>
-      <p:nvGrpSpPr>
-        <p:cNvPr id="1" name=""/>
-        <p:cNvGrpSpPr/>
-        <p:nvPr/>
-      </p:nvGrpSpPr>
-      <p:grpSpPr>
-        <a:xfrm>
-          <a:off x="0" y="0"/>
-          <a:ext cx="0" cy="0"/>
-          <a:chOff x="0" y="0"/>
-          <a:chExt cx="0" cy="0"/>
-        </a:xfrm>
-      </p:grpSpPr>
-      <p:sp>
-        <p:nvSpPr>
-          <p:cNvPr id="2" name="Title 1"/>
-          <p:cNvSpPr>
-            <a:spLocks noGrp="1"/>
-          </p:cNvSpPr>
-          <p:nvPr>
-            <p:ph type="title"/>
-          </p:nvPr>
-        </p:nvSpPr>
-        <p:spPr/>
-        <p:txBody>
-          <a:bodyPr/>
-          <a:lstStyle/>
-          <a:p>
-            <a:r>
-              <a:rPr lang="en-US" dirty="0" smtClean="0"/>
-              <a:t>DI Containers</a:t>
-            </a:r>
-            <a:endParaRPr lang="en-US" dirty="0"/>
-          </a:p>
-        </p:txBody>
-      </p:sp>
-      <p:sp>
-        <p:nvSpPr>
-          <p:cNvPr id="3" name="Content Placeholder 2"/>
-          <p:cNvSpPr>
-            <a:spLocks noGrp="1"/>
-          </p:cNvSpPr>
-          <p:nvPr>
-            <p:ph idx="1"/>
-          </p:nvPr>
-        </p:nvSpPr>
-        <p:spPr/>
-        <p:txBody>
-          <a:bodyPr>
-            <a:normAutofit/>
-          </a:bodyPr>
-          <a:lstStyle/>
-          <a:p>
-            <a:r>
-              <a:rPr lang="en-US" dirty="0" smtClean="0"/>
-              <a:t>Popular .NET choices: </a:t>
-            </a:r>
-          </a:p>
-          <a:p>
-            <a:pPr lvl="1"/>
-            <a:r>
-              <a:rPr lang="en-US" sz="2800" dirty="0" smtClean="0"/>
-              <a:t>StructureMap, </a:t>
-            </a:r>
-            <a:r>
-              <a:rPr lang="en-US" sz="2800" dirty="0" err="1" smtClean="0"/>
-              <a:t>Ninject</a:t>
-            </a:r>
-            <a:endParaRPr lang="en-US" sz="2800" dirty="0" smtClean="0"/>
-          </a:p>
-          <a:p>
-            <a:r>
-              <a:rPr lang="en-US" dirty="0" smtClean="0"/>
-              <a:t>Other .NET choices: </a:t>
-            </a:r>
-          </a:p>
-          <a:p>
-            <a:pPr lvl="1"/>
-            <a:r>
-              <a:rPr lang="en-US" sz="2800" dirty="0" smtClean="0"/>
-              <a:t>Unity, Castle Windsor, </a:t>
-            </a:r>
-            <a:r>
-              <a:rPr lang="en-US" sz="2800" dirty="0" err="1" smtClean="0"/>
-              <a:t>Autofac</a:t>
-            </a:r>
-            <a:r>
-              <a:rPr lang="en-US" sz="2800" dirty="0" smtClean="0"/>
-              <a:t>, Spring .NET</a:t>
-            </a:r>
-          </a:p>
-          <a:p>
-            <a:r>
-              <a:rPr lang="en-US" dirty="0" smtClean="0"/>
-              <a:t>Java</a:t>
-            </a:r>
-          </a:p>
-          <a:p>
-            <a:pPr lvl="1"/>
-            <a:r>
-              <a:rPr lang="en-US" sz="2800" dirty="0" smtClean="0"/>
-              <a:t>Spring</a:t>
-            </a:r>
-          </a:p>
-          <a:p>
-            <a:r>
-              <a:rPr lang="en-US" dirty="0" smtClean="0"/>
-              <a:t>Ruby</a:t>
-            </a:r>
-          </a:p>
-          <a:p>
-            <a:pPr lvl="1"/>
-            <a:r>
-              <a:rPr lang="en-US" sz="2800" dirty="0" smtClean="0"/>
-              <a:t>We don’t need no </a:t>
-            </a:r>
-            <a:r>
-              <a:rPr lang="en-US" sz="2800" dirty="0" err="1" smtClean="0"/>
-              <a:t>stinkin</a:t>
-            </a:r>
-            <a:r>
-              <a:rPr lang="en-US" sz="2800" dirty="0" smtClean="0"/>
-              <a:t>’ DI containers!</a:t>
-            </a:r>
-          </a:p>
-        </p:txBody>
-      </p:sp>
-    </p:spTree>
-  </p:cSld>
-  <p:clrMapOvr>
-    <a:masterClrMapping/>
-  </p:clrMapOvr>
-  <p:timing>
-    <p:tnLst>
-      <p:par>
-        <p:cTn id="1" dur="indefinite" restart="never" nodeType="tmRoot"/>
-      </p:par>
-    </p:tnLst>
-  </p:timing>
-</p:sld>
-</file>
-
 <file path=ppt/slides/slide68.xml><?xml version="1.0" encoding="utf-8"?>
 <p:sld xmlns:a="http://schemas.openxmlformats.org/drawingml/2006/main" xmlns:r="http://schemas.openxmlformats.org/officeDocument/2006/relationships" xmlns:p="http://schemas.openxmlformats.org/presentationml/2006/main">
   <p:cSld>
@@ -22213,388 +22612,105 @@
         </p:nvSpPr>
         <p:spPr/>
         <p:txBody>
+          <a:bodyPr/>
+          <a:lstStyle/>
+          <a:p>
+            <a:r>
+              <a:rPr lang="en-US" dirty="0" smtClean="0"/>
+              <a:t>DI Containers</a:t>
+            </a:r>
+            <a:endParaRPr lang="en-US" dirty="0"/>
+          </a:p>
+        </p:txBody>
+      </p:sp>
+      <p:sp>
+        <p:nvSpPr>
+          <p:cNvPr id="3" name="Content Placeholder 2"/>
+          <p:cNvSpPr>
+            <a:spLocks noGrp="1"/>
+          </p:cNvSpPr>
+          <p:nvPr>
+            <p:ph idx="1"/>
+          </p:nvPr>
+        </p:nvSpPr>
+        <p:spPr/>
+        <p:txBody>
           <a:bodyPr>
-            <a:normAutofit fontScale="90000"/>
+            <a:normAutofit/>
           </a:bodyPr>
           <a:lstStyle/>
           <a:p>
             <a:r>
               <a:rPr lang="en-US" dirty="0" smtClean="0"/>
-              <a:t>Enabling DIP – </a:t>
-            </a:r>
-            <a:r>
-              <a:rPr lang="en-US" dirty="0"/>
-              <a:t>C</a:t>
-            </a:r>
+              <a:t>Popular .NET choices: </a:t>
+            </a:r>
+          </a:p>
+          <a:p>
+            <a:pPr lvl="1"/>
+            <a:r>
+              <a:rPr lang="en-US" sz="2800" dirty="0" smtClean="0"/>
+              <a:t>StructureMap, </a:t>
+            </a:r>
+            <a:r>
+              <a:rPr lang="en-US" sz="2800" dirty="0" err="1" smtClean="0"/>
+              <a:t>Ninject</a:t>
+            </a:r>
+            <a:endParaRPr lang="en-US" sz="2800" dirty="0" smtClean="0"/>
+          </a:p>
+          <a:p>
             <a:r>
               <a:rPr lang="en-US" dirty="0" smtClean="0"/>
-              <a:t>onstructor </a:t>
-            </a:r>
-            <a:r>
-              <a:rPr lang="en-US" dirty="0"/>
-              <a:t>I</a:t>
-            </a:r>
+              <a:t>Other .NET choices: </a:t>
+            </a:r>
+          </a:p>
+          <a:p>
+            <a:pPr lvl="1"/>
+            <a:r>
+              <a:rPr lang="en-US" sz="2800" dirty="0" smtClean="0"/>
+              <a:t>Unity, Castle Windsor, </a:t>
+            </a:r>
+            <a:r>
+              <a:rPr lang="en-US" sz="2800" dirty="0" err="1" smtClean="0"/>
+              <a:t>Autofac</a:t>
+            </a:r>
+            <a:r>
+              <a:rPr lang="en-US" sz="2800" dirty="0" smtClean="0"/>
+              <a:t>, Spring .NET</a:t>
+            </a:r>
+          </a:p>
+          <a:p>
             <a:r>
               <a:rPr lang="en-US" dirty="0" smtClean="0"/>
-              <a:t>njection</a:t>
-            </a:r>
-            <a:endParaRPr lang="en-US" dirty="0"/>
-          </a:p>
-        </p:txBody>
-      </p:sp>
-      <p:sp>
-        <p:nvSpPr>
-          <p:cNvPr id="4" name="TextBox 3"/>
-          <p:cNvSpPr txBox="1"/>
-          <p:nvPr/>
-        </p:nvSpPr>
-        <p:spPr>
-          <a:xfrm>
-            <a:off x="609600" y="1600200"/>
-            <a:ext cx="8077200" cy="4524315"/>
-          </a:xfrm>
-          <a:prstGeom prst="rect">
-            <a:avLst/>
-          </a:prstGeom>
-          <a:solidFill>
-            <a:schemeClr val="bg1">
-              <a:lumMod val="85000"/>
-            </a:schemeClr>
-          </a:solidFill>
-        </p:spPr>
-        <p:txBody>
-          <a:bodyPr wrap="square" rtlCol="0">
-            <a:spAutoFit/>
-          </a:bodyPr>
-          <a:lstStyle/>
-          <a:p>
-            <a:r>
-              <a:rPr lang="en-US" b="1" dirty="0" smtClean="0">
-                <a:latin typeface="Courier New" pitchFamily="49" charset="0"/>
-                <a:cs typeface="Courier New" pitchFamily="49" charset="0"/>
-              </a:rPr>
-              <a:t>public class </a:t>
-            </a:r>
-            <a:r>
-              <a:rPr lang="en-US" b="1" dirty="0" err="1" smtClean="0">
-                <a:latin typeface="Courier New" pitchFamily="49" charset="0"/>
-                <a:cs typeface="Courier New" pitchFamily="49" charset="0"/>
-              </a:rPr>
-              <a:t>GetProductService</a:t>
-            </a:r>
-            <a:r>
-              <a:rPr lang="en-US" b="1" dirty="0" smtClean="0">
-                <a:latin typeface="Courier New" pitchFamily="49" charset="0"/>
-                <a:cs typeface="Courier New" pitchFamily="49" charset="0"/>
-              </a:rPr>
-              <a:t> : </a:t>
-            </a:r>
-            <a:r>
-              <a:rPr lang="en-US" b="1" dirty="0" err="1" smtClean="0">
-                <a:solidFill>
-                  <a:srgbClr val="FF0000"/>
-                </a:solidFill>
-                <a:latin typeface="Courier New" pitchFamily="49" charset="0"/>
-                <a:cs typeface="Courier New" pitchFamily="49" charset="0"/>
-              </a:rPr>
-              <a:t>IGetProductService</a:t>
-            </a:r>
-            <a:endParaRPr lang="en-US" b="1" dirty="0" smtClean="0">
-              <a:solidFill>
-                <a:srgbClr val="FF0000"/>
-              </a:solidFill>
-              <a:latin typeface="Courier New" pitchFamily="49" charset="0"/>
-              <a:cs typeface="Courier New" pitchFamily="49" charset="0"/>
-            </a:endParaRPr>
-          </a:p>
-          <a:p>
-            <a:r>
-              <a:rPr lang="en-US" b="1" dirty="0" smtClean="0">
-                <a:latin typeface="Courier New" pitchFamily="49" charset="0"/>
-                <a:cs typeface="Courier New" pitchFamily="49" charset="0"/>
-              </a:rPr>
-              <a:t>{</a:t>
-            </a:r>
-          </a:p>
-          <a:p>
-            <a:r>
-              <a:rPr lang="en-US" b="1" dirty="0" smtClean="0">
-                <a:latin typeface="Courier New" pitchFamily="49" charset="0"/>
-                <a:cs typeface="Courier New" pitchFamily="49" charset="0"/>
-              </a:rPr>
-              <a:t>    private </a:t>
-            </a:r>
-            <a:r>
-              <a:rPr lang="en-US" b="1" dirty="0" err="1" smtClean="0">
-                <a:latin typeface="Courier New" pitchFamily="49" charset="0"/>
-                <a:cs typeface="Courier New" pitchFamily="49" charset="0"/>
-              </a:rPr>
-              <a:t>IProductRepository</a:t>
-            </a:r>
-            <a:r>
-              <a:rPr lang="en-US" b="1" dirty="0" smtClean="0">
-                <a:latin typeface="Courier New" pitchFamily="49" charset="0"/>
-                <a:cs typeface="Courier New" pitchFamily="49" charset="0"/>
-              </a:rPr>
-              <a:t> _</a:t>
-            </a:r>
-            <a:r>
-              <a:rPr lang="en-US" b="1" dirty="0" err="1" smtClean="0">
-                <a:latin typeface="Courier New" pitchFamily="49" charset="0"/>
-                <a:cs typeface="Courier New" pitchFamily="49" charset="0"/>
-              </a:rPr>
-              <a:t>productRepository</a:t>
-            </a:r>
-            <a:r>
-              <a:rPr lang="en-US" b="1" dirty="0" smtClean="0">
-                <a:latin typeface="Courier New" pitchFamily="49" charset="0"/>
-                <a:cs typeface="Courier New" pitchFamily="49" charset="0"/>
-              </a:rPr>
-              <a:t>;</a:t>
-            </a:r>
-          </a:p>
-          <a:p>
-            <a:endParaRPr lang="en-US" b="1" dirty="0" smtClean="0">
-              <a:latin typeface="Courier New" pitchFamily="49" charset="0"/>
-              <a:cs typeface="Courier New" pitchFamily="49" charset="0"/>
-            </a:endParaRPr>
-          </a:p>
-          <a:p>
-            <a:r>
-              <a:rPr lang="en-US" b="1" dirty="0" smtClean="0">
-                <a:latin typeface="Courier New" pitchFamily="49" charset="0"/>
-                <a:cs typeface="Courier New" pitchFamily="49" charset="0"/>
-              </a:rPr>
-              <a:t>    public </a:t>
-            </a:r>
-            <a:r>
-              <a:rPr lang="en-US" b="1" dirty="0" err="1" smtClean="0">
-                <a:latin typeface="Courier New" pitchFamily="49" charset="0"/>
-                <a:cs typeface="Courier New" pitchFamily="49" charset="0"/>
-              </a:rPr>
-              <a:t>GetProductService</a:t>
-            </a:r>
-            <a:r>
-              <a:rPr lang="en-US" b="1" dirty="0" smtClean="0">
-                <a:latin typeface="Courier New" pitchFamily="49" charset="0"/>
-                <a:cs typeface="Courier New" pitchFamily="49" charset="0"/>
-              </a:rPr>
-              <a:t>(</a:t>
-            </a:r>
-          </a:p>
-          <a:p>
-            <a:r>
-              <a:rPr lang="en-US" b="1" dirty="0" smtClean="0">
-                <a:latin typeface="Courier New" pitchFamily="49" charset="0"/>
-                <a:cs typeface="Courier New" pitchFamily="49" charset="0"/>
-              </a:rPr>
-              <a:t>        </a:t>
-            </a:r>
-            <a:r>
-              <a:rPr lang="en-US" b="1" dirty="0" err="1" smtClean="0">
-                <a:solidFill>
-                  <a:srgbClr val="FF0000"/>
-                </a:solidFill>
-                <a:latin typeface="Courier New" pitchFamily="49" charset="0"/>
-                <a:cs typeface="Courier New" pitchFamily="49" charset="0"/>
-              </a:rPr>
-              <a:t>IProductRepository</a:t>
-            </a:r>
-            <a:r>
-              <a:rPr lang="en-US" b="1" dirty="0" smtClean="0">
-                <a:solidFill>
-                  <a:srgbClr val="FF0000"/>
-                </a:solidFill>
-                <a:latin typeface="Courier New" pitchFamily="49" charset="0"/>
-                <a:cs typeface="Courier New" pitchFamily="49" charset="0"/>
-              </a:rPr>
-              <a:t> </a:t>
-            </a:r>
-            <a:r>
-              <a:rPr lang="en-US" b="1" dirty="0" err="1" smtClean="0">
-                <a:solidFill>
-                  <a:srgbClr val="FF0000"/>
-                </a:solidFill>
-                <a:latin typeface="Courier New" pitchFamily="49" charset="0"/>
-                <a:cs typeface="Courier New" pitchFamily="49" charset="0"/>
-              </a:rPr>
-              <a:t>productRepository</a:t>
-            </a:r>
-            <a:r>
-              <a:rPr lang="en-US" b="1" dirty="0" smtClean="0">
-                <a:latin typeface="Courier New" pitchFamily="49" charset="0"/>
-                <a:cs typeface="Courier New" pitchFamily="49" charset="0"/>
-              </a:rPr>
-              <a:t>)</a:t>
-            </a:r>
-          </a:p>
-          <a:p>
-            <a:r>
-              <a:rPr lang="en-US" b="1" dirty="0" smtClean="0">
-                <a:latin typeface="Courier New" pitchFamily="49" charset="0"/>
-                <a:cs typeface="Courier New" pitchFamily="49" charset="0"/>
-              </a:rPr>
-              <a:t>    {</a:t>
-            </a:r>
-          </a:p>
-          <a:p>
-            <a:r>
-              <a:rPr lang="en-US" b="1" dirty="0" smtClean="0">
-                <a:latin typeface="Courier New" pitchFamily="49" charset="0"/>
-                <a:cs typeface="Courier New" pitchFamily="49" charset="0"/>
-              </a:rPr>
-              <a:t>        _</a:t>
-            </a:r>
-            <a:r>
-              <a:rPr lang="en-US" b="1" dirty="0" err="1" smtClean="0">
-                <a:latin typeface="Courier New" pitchFamily="49" charset="0"/>
-                <a:cs typeface="Courier New" pitchFamily="49" charset="0"/>
-              </a:rPr>
-              <a:t>productRepository</a:t>
-            </a:r>
-            <a:r>
-              <a:rPr lang="en-US" b="1" dirty="0" smtClean="0">
-                <a:latin typeface="Courier New" pitchFamily="49" charset="0"/>
-                <a:cs typeface="Courier New" pitchFamily="49" charset="0"/>
-              </a:rPr>
-              <a:t> = </a:t>
-            </a:r>
-            <a:r>
-              <a:rPr lang="en-US" b="1" dirty="0" err="1" smtClean="0">
-                <a:latin typeface="Courier New" pitchFamily="49" charset="0"/>
-                <a:cs typeface="Courier New" pitchFamily="49" charset="0"/>
-              </a:rPr>
-              <a:t>productRepository</a:t>
-            </a:r>
-            <a:r>
-              <a:rPr lang="en-US" b="1" dirty="0" smtClean="0">
-                <a:latin typeface="Courier New" pitchFamily="49" charset="0"/>
-                <a:cs typeface="Courier New" pitchFamily="49" charset="0"/>
-              </a:rPr>
-              <a:t>;</a:t>
-            </a:r>
-          </a:p>
-          <a:p>
-            <a:r>
-              <a:rPr lang="en-US" b="1" dirty="0" smtClean="0">
-                <a:latin typeface="Courier New" pitchFamily="49" charset="0"/>
-                <a:cs typeface="Courier New" pitchFamily="49" charset="0"/>
-              </a:rPr>
-              <a:t>    }</a:t>
-            </a:r>
-          </a:p>
-          <a:p>
-            <a:endParaRPr lang="en-US" b="1" dirty="0" smtClean="0">
-              <a:latin typeface="Courier New" pitchFamily="49" charset="0"/>
-              <a:cs typeface="Courier New" pitchFamily="49" charset="0"/>
-            </a:endParaRPr>
-          </a:p>
-          <a:p>
-            <a:r>
-              <a:rPr lang="en-US" b="1" dirty="0" smtClean="0">
-                <a:latin typeface="Courier New" pitchFamily="49" charset="0"/>
-                <a:cs typeface="Courier New" pitchFamily="49" charset="0"/>
-              </a:rPr>
-              <a:t>    public </a:t>
-            </a:r>
-            <a:r>
-              <a:rPr lang="en-US" b="1" dirty="0" err="1" smtClean="0">
-                <a:latin typeface="Courier New" pitchFamily="49" charset="0"/>
-                <a:cs typeface="Courier New" pitchFamily="49" charset="0"/>
-              </a:rPr>
-              <a:t>IList</a:t>
-            </a:r>
-            <a:r>
-              <a:rPr lang="en-US" b="1" dirty="0" smtClean="0">
-                <a:latin typeface="Courier New" pitchFamily="49" charset="0"/>
-                <a:cs typeface="Courier New" pitchFamily="49" charset="0"/>
-              </a:rPr>
-              <a:t>&lt;Product&gt; </a:t>
-            </a:r>
-            <a:r>
-              <a:rPr lang="en-US" b="1" dirty="0" err="1" smtClean="0">
-                <a:latin typeface="Courier New" pitchFamily="49" charset="0"/>
-                <a:cs typeface="Courier New" pitchFamily="49" charset="0"/>
-              </a:rPr>
-              <a:t>GetProductById</a:t>
-            </a:r>
-            <a:r>
-              <a:rPr lang="en-US" b="1" dirty="0" smtClean="0">
-                <a:latin typeface="Courier New" pitchFamily="49" charset="0"/>
-                <a:cs typeface="Courier New" pitchFamily="49" charset="0"/>
-              </a:rPr>
-              <a:t>(</a:t>
-            </a:r>
-            <a:r>
-              <a:rPr lang="en-US" b="1" dirty="0" err="1" smtClean="0">
-                <a:latin typeface="Courier New" pitchFamily="49" charset="0"/>
-                <a:cs typeface="Courier New" pitchFamily="49" charset="0"/>
-              </a:rPr>
-              <a:t>int</a:t>
-            </a:r>
-            <a:r>
-              <a:rPr lang="en-US" b="1" dirty="0" smtClean="0">
-                <a:latin typeface="Courier New" pitchFamily="49" charset="0"/>
-                <a:cs typeface="Courier New" pitchFamily="49" charset="0"/>
-              </a:rPr>
-              <a:t> id)</a:t>
-            </a:r>
-          </a:p>
-          <a:p>
-            <a:r>
-              <a:rPr lang="en-US" b="1" dirty="0" smtClean="0">
-                <a:latin typeface="Courier New" pitchFamily="49" charset="0"/>
-                <a:cs typeface="Courier New" pitchFamily="49" charset="0"/>
-              </a:rPr>
-              <a:t>    {</a:t>
-            </a:r>
-          </a:p>
-          <a:p>
-            <a:r>
-              <a:rPr lang="en-US" b="1" dirty="0" smtClean="0">
-                <a:latin typeface="Courier New" pitchFamily="49" charset="0"/>
-                <a:cs typeface="Courier New" pitchFamily="49" charset="0"/>
-              </a:rPr>
-              <a:t>        return _</a:t>
-            </a:r>
-            <a:r>
-              <a:rPr lang="en-US" b="1" dirty="0" err="1" smtClean="0">
-                <a:latin typeface="Courier New" pitchFamily="49" charset="0"/>
-                <a:cs typeface="Courier New" pitchFamily="49" charset="0"/>
-              </a:rPr>
-              <a:t>productRepository.Get</a:t>
-            </a:r>
-            <a:r>
-              <a:rPr lang="en-US" b="1" dirty="0" smtClean="0">
-                <a:latin typeface="Courier New" pitchFamily="49" charset="0"/>
-                <a:cs typeface="Courier New" pitchFamily="49" charset="0"/>
-              </a:rPr>
-              <a:t>(id);</a:t>
-            </a:r>
-          </a:p>
-          <a:p>
-            <a:r>
-              <a:rPr lang="en-US" b="1" dirty="0" smtClean="0">
-                <a:latin typeface="Courier New" pitchFamily="49" charset="0"/>
-                <a:cs typeface="Courier New" pitchFamily="49" charset="0"/>
-              </a:rPr>
-              <a:t>    }</a:t>
-            </a:r>
-          </a:p>
-          <a:p>
-            <a:r>
-              <a:rPr lang="en-US" b="1" dirty="0" smtClean="0">
-                <a:latin typeface="Courier New" pitchFamily="49" charset="0"/>
-                <a:cs typeface="Courier New" pitchFamily="49" charset="0"/>
-              </a:rPr>
-              <a:t>}</a:t>
-            </a:r>
-          </a:p>
-          <a:p>
-            <a:endParaRPr lang="en-US" b="1" dirty="0">
-              <a:latin typeface="Courier New" pitchFamily="49" charset="0"/>
-              <a:cs typeface="Courier New" pitchFamily="49" charset="0"/>
-            </a:endParaRPr>
+              <a:t>Java</a:t>
+            </a:r>
+          </a:p>
+          <a:p>
+            <a:pPr lvl="1"/>
+            <a:r>
+              <a:rPr lang="en-US" sz="2800" dirty="0" smtClean="0"/>
+              <a:t>Spring</a:t>
+            </a:r>
+          </a:p>
+          <a:p>
+            <a:r>
+              <a:rPr lang="en-US" dirty="0" smtClean="0"/>
+              <a:t>Ruby</a:t>
+            </a:r>
+          </a:p>
+          <a:p>
+            <a:pPr lvl="1"/>
+            <a:r>
+              <a:rPr lang="en-US" sz="2800" dirty="0" smtClean="0"/>
+              <a:t>We don’t need no </a:t>
+            </a:r>
+            <a:r>
+              <a:rPr lang="en-US" sz="2800" dirty="0" err="1" smtClean="0"/>
+              <a:t>stinkin</a:t>
+            </a:r>
+            <a:r>
+              <a:rPr lang="en-US" sz="2800" dirty="0" smtClean="0"/>
+              <a:t>’ DI containers!</a:t>
+            </a:r>
           </a:p>
         </p:txBody>
       </p:sp>
@@ -25434,24 +25550,22 @@
               <a:rPr lang="en-US" sz="2800" b="1" dirty="0" smtClean="0">
                 <a:hlinkClick r:id="rId2"/>
               </a:rPr>
-              <a:t>http://</a:t>
-            </a:r>
-            <a:r>
-              <a:rPr lang="en-US" sz="2800" b="1" dirty="0" smtClean="0">
-                <a:hlinkClick r:id="rId2"/>
-              </a:rPr>
-              <a:t>jonkruger.com/blog</a:t>
+              <a:t>http://jonkruger.com/blog</a:t>
             </a:r>
             <a:endParaRPr lang="en-US" sz="2800" b="1" dirty="0" smtClean="0"/>
           </a:p>
           <a:p>
             <a:r>
-              <a:rPr lang="en-US" sz="2800" dirty="0" smtClean="0"/>
-              <a:t>TDD Boot Camp:</a:t>
+              <a:rPr lang="en-US" sz="2800" smtClean="0"/>
+              <a:t>TDD training:</a:t>
+            </a:r>
+            <a:r>
+              <a:rPr lang="en-US" sz="2800" b="1" smtClean="0"/>
+              <a:t> </a:t>
             </a:r>
             <a:r>
               <a:rPr lang="en-US" sz="2800" b="1" dirty="0" smtClean="0"/>
-              <a:t> http://tddbootcamp.com</a:t>
+              <a:t>http://tddbootcamp.com</a:t>
             </a:r>
             <a:endParaRPr lang="en-US" sz="2800" b="1" dirty="0"/>
           </a:p>

</xml_diff>

<commit_message>
removed extra text that somehow got shoved into a slide accidentally
</commit_message>
<xml_diff>
--- a/SOLID Software Design Principles - without small methods.pptx
+++ b/SOLID Software Design Principles - without small methods.pptx
@@ -269,7 +269,7 @@
             <a:fld id="{CE22DD2D-CE48-432A-B750-FE638311F72D}" type="datetimeFigureOut">
               <a:rPr lang="en-US" smtClean="0"/>
               <a:pPr/>
-              <a:t>2/26/2010</a:t>
+              <a:t>3/22/2010</a:t>
             </a:fld>
             <a:endParaRPr lang="en-US"/>
           </a:p>
@@ -2976,7 +2976,7 @@
             <a:fld id="{C3F416CD-67A3-4CF0-A210-F6AF31AC147F}" type="datetimeFigureOut">
               <a:rPr lang="en-US" smtClean="0"/>
               <a:pPr/>
-              <a:t>2/26/2010</a:t>
+              <a:t>3/22/2010</a:t>
             </a:fld>
             <a:endParaRPr lang="en-US"/>
           </a:p>
@@ -3156,7 +3156,7 @@
             <a:fld id="{C3F416CD-67A3-4CF0-A210-F6AF31AC147F}" type="datetimeFigureOut">
               <a:rPr lang="en-US" smtClean="0"/>
               <a:pPr/>
-              <a:t>2/26/2010</a:t>
+              <a:t>3/22/2010</a:t>
             </a:fld>
             <a:endParaRPr lang="en-US"/>
           </a:p>
@@ -3333,7 +3333,7 @@
             <a:fld id="{C3F416CD-67A3-4CF0-A210-F6AF31AC147F}" type="datetimeFigureOut">
               <a:rPr lang="en-US" smtClean="0"/>
               <a:pPr/>
-              <a:t>2/26/2010</a:t>
+              <a:t>3/22/2010</a:t>
             </a:fld>
             <a:endParaRPr lang="en-US"/>
           </a:p>
@@ -3500,7 +3500,7 @@
             <a:fld id="{C3F416CD-67A3-4CF0-A210-F6AF31AC147F}" type="datetimeFigureOut">
               <a:rPr lang="en-US" smtClean="0"/>
               <a:pPr/>
-              <a:t>2/26/2010</a:t>
+              <a:t>3/22/2010</a:t>
             </a:fld>
             <a:endParaRPr lang="en-US"/>
           </a:p>
@@ -3713,7 +3713,7 @@
             <a:fld id="{C3F416CD-67A3-4CF0-A210-F6AF31AC147F}" type="datetimeFigureOut">
               <a:rPr lang="en-US" smtClean="0"/>
               <a:pPr/>
-              <a:t>2/26/2010</a:t>
+              <a:t>3/22/2010</a:t>
             </a:fld>
             <a:endParaRPr lang="en-US"/>
           </a:p>
@@ -3998,7 +3998,7 @@
             <a:fld id="{C3F416CD-67A3-4CF0-A210-F6AF31AC147F}" type="datetimeFigureOut">
               <a:rPr lang="en-US" smtClean="0"/>
               <a:pPr/>
-              <a:t>2/26/2010</a:t>
+              <a:t>3/22/2010</a:t>
             </a:fld>
             <a:endParaRPr lang="en-US"/>
           </a:p>
@@ -4430,7 +4430,7 @@
             <a:fld id="{C3F416CD-67A3-4CF0-A210-F6AF31AC147F}" type="datetimeFigureOut">
               <a:rPr lang="en-US" smtClean="0"/>
               <a:pPr algn="l" eaLnBrk="1" latinLnBrk="0" hangingPunct="1"/>
-              <a:t>2/26/2010</a:t>
+              <a:t>3/22/2010</a:t>
             </a:fld>
             <a:endParaRPr lang="en-US"/>
           </a:p>
@@ -4550,7 +4550,7 @@
             <a:fld id="{C3F416CD-67A3-4CF0-A210-F6AF31AC147F}" type="datetimeFigureOut">
               <a:rPr lang="en-US" smtClean="0"/>
               <a:pPr/>
-              <a:t>2/26/2010</a:t>
+              <a:t>3/22/2010</a:t>
             </a:fld>
             <a:endParaRPr lang="en-US"/>
           </a:p>
@@ -4642,7 +4642,7 @@
             <a:fld id="{C3F416CD-67A3-4CF0-A210-F6AF31AC147F}" type="datetimeFigureOut">
               <a:rPr lang="en-US" smtClean="0"/>
               <a:pPr/>
-              <a:t>2/26/2010</a:t>
+              <a:t>3/22/2010</a:t>
             </a:fld>
             <a:endParaRPr lang="en-US"/>
           </a:p>
@@ -4933,7 +4933,7 @@
             <a:fld id="{C3F416CD-67A3-4CF0-A210-F6AF31AC147F}" type="datetimeFigureOut">
               <a:rPr lang="en-US" smtClean="0"/>
               <a:pPr/>
-              <a:t>2/26/2010</a:t>
+              <a:t>3/22/2010</a:t>
             </a:fld>
             <a:endParaRPr lang="en-US"/>
           </a:p>
@@ -5260,7 +5260,7 @@
             <a:fld id="{C3F416CD-67A3-4CF0-A210-F6AF31AC147F}" type="datetimeFigureOut">
               <a:rPr lang="en-US" smtClean="0"/>
               <a:pPr/>
-              <a:t>2/26/2010</a:t>
+              <a:t>3/22/2010</a:t>
             </a:fld>
             <a:endParaRPr lang="en-US"/>
           </a:p>
@@ -5481,7 +5481,7 @@
             <a:fld id="{C3F416CD-67A3-4CF0-A210-F6AF31AC147F}" type="datetimeFigureOut">
               <a:rPr lang="en-US" smtClean="0"/>
               <a:pPr algn="l" eaLnBrk="1" latinLnBrk="0" hangingPunct="1"/>
-              <a:t>2/26/2010</a:t>
+              <a:t>3/22/2010</a:t>
             </a:fld>
             <a:endParaRPr lang="en-US" sz="800" dirty="0">
               <a:solidFill>
@@ -21646,34 +21646,6 @@
               <a:latin typeface="Courier New" pitchFamily="49" charset="0"/>
               <a:cs typeface="Courier New" pitchFamily="49" charset="0"/>
             </a:endParaRPr>
-          </a:p>
-        </p:txBody>
-      </p:sp>
-      <p:sp>
-        <p:nvSpPr>
-          <p:cNvPr id="6" name="Rectangle 5"/>
-          <p:cNvSpPr/>
-          <p:nvPr/>
-        </p:nvSpPr>
-        <p:spPr>
-          <a:xfrm>
-            <a:off x="3854496" y="3244334"/>
-            <a:ext cx="1435008" cy="369332"/>
-          </a:xfrm>
-          <a:prstGeom prst="rect">
-            <a:avLst/>
-          </a:prstGeom>
-        </p:spPr>
-        <p:txBody>
-          <a:bodyPr wrap="none">
-            <a:spAutoFit/>
-          </a:bodyPr>
-          <a:lstStyle/>
-          <a:p>
-            <a:r>
-              <a:rPr lang="en-US" dirty="0" smtClean="0"/>
-              <a:t> return order</a:t>
-            </a:r>
           </a:p>
         </p:txBody>
       </p:sp>

</xml_diff>

<commit_message>
added TDD Boot Camp information
</commit_message>
<xml_diff>
--- a/SOLID Software Design Principles - without small methods.pptx
+++ b/SOLID Software Design Principles - without small methods.pptx
@@ -9,7 +9,7 @@
   </p:notesMasterIdLst>
   <p:sldIdLst>
     <p:sldId id="256" r:id="rId2"/>
-    <p:sldId id="258" r:id="rId3"/>
+    <p:sldId id="357" r:id="rId3"/>
     <p:sldId id="344" r:id="rId4"/>
     <p:sldId id="345" r:id="rId5"/>
     <p:sldId id="265" r:id="rId6"/>
@@ -269,7 +269,7 @@
             <a:fld id="{CE22DD2D-CE48-432A-B750-FE638311F72D}" type="datetimeFigureOut">
               <a:rPr lang="en-US" smtClean="0"/>
               <a:pPr/>
-              <a:t>3/22/2010</a:t>
+              <a:t>4/28/2010</a:t>
             </a:fld>
             <a:endParaRPr lang="en-US"/>
           </a:p>
@@ -2976,7 +2976,7 @@
             <a:fld id="{C3F416CD-67A3-4CF0-A210-F6AF31AC147F}" type="datetimeFigureOut">
               <a:rPr lang="en-US" smtClean="0"/>
               <a:pPr/>
-              <a:t>3/22/2010</a:t>
+              <a:t>4/28/2010</a:t>
             </a:fld>
             <a:endParaRPr lang="en-US"/>
           </a:p>
@@ -3156,7 +3156,7 @@
             <a:fld id="{C3F416CD-67A3-4CF0-A210-F6AF31AC147F}" type="datetimeFigureOut">
               <a:rPr lang="en-US" smtClean="0"/>
               <a:pPr/>
-              <a:t>3/22/2010</a:t>
+              <a:t>4/28/2010</a:t>
             </a:fld>
             <a:endParaRPr lang="en-US"/>
           </a:p>
@@ -3333,7 +3333,7 @@
             <a:fld id="{C3F416CD-67A3-4CF0-A210-F6AF31AC147F}" type="datetimeFigureOut">
               <a:rPr lang="en-US" smtClean="0"/>
               <a:pPr/>
-              <a:t>3/22/2010</a:t>
+              <a:t>4/28/2010</a:t>
             </a:fld>
             <a:endParaRPr lang="en-US"/>
           </a:p>
@@ -3500,7 +3500,7 @@
             <a:fld id="{C3F416CD-67A3-4CF0-A210-F6AF31AC147F}" type="datetimeFigureOut">
               <a:rPr lang="en-US" smtClean="0"/>
               <a:pPr/>
-              <a:t>3/22/2010</a:t>
+              <a:t>4/28/2010</a:t>
             </a:fld>
             <a:endParaRPr lang="en-US"/>
           </a:p>
@@ -3713,7 +3713,7 @@
             <a:fld id="{C3F416CD-67A3-4CF0-A210-F6AF31AC147F}" type="datetimeFigureOut">
               <a:rPr lang="en-US" smtClean="0"/>
               <a:pPr/>
-              <a:t>3/22/2010</a:t>
+              <a:t>4/28/2010</a:t>
             </a:fld>
             <a:endParaRPr lang="en-US"/>
           </a:p>
@@ -3998,7 +3998,7 @@
             <a:fld id="{C3F416CD-67A3-4CF0-A210-F6AF31AC147F}" type="datetimeFigureOut">
               <a:rPr lang="en-US" smtClean="0"/>
               <a:pPr/>
-              <a:t>3/22/2010</a:t>
+              <a:t>4/28/2010</a:t>
             </a:fld>
             <a:endParaRPr lang="en-US"/>
           </a:p>
@@ -4430,7 +4430,7 @@
             <a:fld id="{C3F416CD-67A3-4CF0-A210-F6AF31AC147F}" type="datetimeFigureOut">
               <a:rPr lang="en-US" smtClean="0"/>
               <a:pPr algn="l" eaLnBrk="1" latinLnBrk="0" hangingPunct="1"/>
-              <a:t>3/22/2010</a:t>
+              <a:t>4/28/2010</a:t>
             </a:fld>
             <a:endParaRPr lang="en-US"/>
           </a:p>
@@ -4550,7 +4550,7 @@
             <a:fld id="{C3F416CD-67A3-4CF0-A210-F6AF31AC147F}" type="datetimeFigureOut">
               <a:rPr lang="en-US" smtClean="0"/>
               <a:pPr/>
-              <a:t>3/22/2010</a:t>
+              <a:t>4/28/2010</a:t>
             </a:fld>
             <a:endParaRPr lang="en-US"/>
           </a:p>
@@ -4642,7 +4642,7 @@
             <a:fld id="{C3F416CD-67A3-4CF0-A210-F6AF31AC147F}" type="datetimeFigureOut">
               <a:rPr lang="en-US" smtClean="0"/>
               <a:pPr/>
-              <a:t>3/22/2010</a:t>
+              <a:t>4/28/2010</a:t>
             </a:fld>
             <a:endParaRPr lang="en-US"/>
           </a:p>
@@ -4933,7 +4933,7 @@
             <a:fld id="{C3F416CD-67A3-4CF0-A210-F6AF31AC147F}" type="datetimeFigureOut">
               <a:rPr lang="en-US" smtClean="0"/>
               <a:pPr/>
-              <a:t>3/22/2010</a:t>
+              <a:t>4/28/2010</a:t>
             </a:fld>
             <a:endParaRPr lang="en-US"/>
           </a:p>
@@ -5260,7 +5260,7 @@
             <a:fld id="{C3F416CD-67A3-4CF0-A210-F6AF31AC147F}" type="datetimeFigureOut">
               <a:rPr lang="en-US" smtClean="0"/>
               <a:pPr/>
-              <a:t>3/22/2010</a:t>
+              <a:t>4/28/2010</a:t>
             </a:fld>
             <a:endParaRPr lang="en-US"/>
           </a:p>
@@ -5481,7 +5481,7 @@
             <a:fld id="{C3F416CD-67A3-4CF0-A210-F6AF31AC147F}" type="datetimeFigureOut">
               <a:rPr lang="en-US" smtClean="0"/>
               <a:pPr algn="l" eaLnBrk="1" latinLnBrk="0" hangingPunct="1"/>
-              <a:t>3/22/2010</a:t>
+              <a:t>4/28/2010</a:t>
             </a:fld>
             <a:endParaRPr lang="en-US" sz="800" dirty="0">
               <a:solidFill>
@@ -25404,26 +25404,11 @@
           <a:p>
             <a:r>
               <a:rPr lang="en-US" sz="2600" dirty="0" smtClean="0"/>
-              <a:t>Uncle Bob talking about SOLID on </a:t>
-            </a:r>
-            <a:r>
-              <a:rPr lang="en-US" sz="2600" dirty="0" err="1" smtClean="0"/>
-              <a:t>Hanselminutes</a:t>
-            </a:r>
-            <a:endParaRPr lang="en-US" sz="2600" dirty="0" smtClean="0"/>
-          </a:p>
-          <a:p>
-            <a:pPr lvl="1"/>
-            <a:r>
-              <a:rPr lang="en-US" sz="2600" b="1" dirty="0" smtClean="0"/>
-              <a:t>http://bit.ly/solid2</a:t>
-            </a:r>
-            <a:endParaRPr lang="en-US" sz="2600" dirty="0" smtClean="0"/>
-          </a:p>
-          <a:p>
+              <a:t>My </a:t>
+            </a:r>
             <a:r>
               <a:rPr lang="en-US" sz="2600" dirty="0" smtClean="0"/>
-              <a:t>My slides </a:t>
+              <a:t>slides </a:t>
             </a:r>
           </a:p>
           <a:p>
@@ -25463,8 +25448,8 @@
         </p:nvSpPr>
         <p:spPr>
           <a:xfrm>
-            <a:off x="381000" y="4724400"/>
-            <a:ext cx="8458200" cy="1815882"/>
+            <a:off x="381000" y="4230231"/>
+            <a:ext cx="8458200" cy="2246769"/>
           </a:xfrm>
           <a:prstGeom prst="rect">
             <a:avLst/>
@@ -25478,15 +25463,12 @@
           <a:lstStyle/>
           <a:p>
             <a:r>
-              <a:rPr lang="en-US" sz="2800" b="1" i="1" u="sng" dirty="0" smtClean="0"/>
-              <a:t>My Info:</a:t>
-            </a:r>
-            <a:endParaRPr lang="en-US" sz="2800" i="1" u="sng" dirty="0" smtClean="0"/>
-          </a:p>
-          <a:p>
-            <a:r>
               <a:rPr lang="en-US" sz="2800" dirty="0" smtClean="0"/>
-              <a:t>email: </a:t>
+              <a:t>email</a:t>
+            </a:r>
+            <a:r>
+              <a:rPr lang="en-US" sz="2800" dirty="0" smtClean="0"/>
+              <a:t>: </a:t>
             </a:r>
             <a:r>
               <a:rPr lang="en-US" sz="2800" b="1" dirty="0" smtClean="0"/>
@@ -25522,22 +25504,46 @@
               <a:rPr lang="en-US" sz="2800" b="1" dirty="0" smtClean="0">
                 <a:hlinkClick r:id="rId2"/>
               </a:rPr>
-              <a:t>http://jonkruger.com/blog</a:t>
+              <a:t>http://</a:t>
+            </a:r>
+            <a:r>
+              <a:rPr lang="en-US" sz="2800" b="1" dirty="0" smtClean="0">
+                <a:hlinkClick r:id="rId2"/>
+              </a:rPr>
+              <a:t>jonkruger.com/blog</a:t>
             </a:r>
             <a:endParaRPr lang="en-US" sz="2800" b="1" dirty="0" smtClean="0"/>
           </a:p>
           <a:p>
-            <a:r>
-              <a:rPr lang="en-US" sz="2800" smtClean="0"/>
+            <a:endParaRPr lang="en-US" sz="2800" b="1" dirty="0" smtClean="0"/>
+          </a:p>
+          <a:p>
+            <a:r>
+              <a:rPr lang="en-US" sz="2800" dirty="0" smtClean="0"/>
               <a:t>TDD training:</a:t>
             </a:r>
             <a:r>
-              <a:rPr lang="en-US" sz="2800" b="1" smtClean="0"/>
+              <a:rPr lang="en-US" sz="2800" b="1" dirty="0" smtClean="0"/>
               <a:t> </a:t>
             </a:r>
             <a:r>
+              <a:rPr lang="en-US" sz="2800" b="1" dirty="0" smtClean="0">
+                <a:hlinkClick r:id="rId3"/>
+              </a:rPr>
+              <a:t>http://</a:t>
+            </a:r>
+            <a:r>
+              <a:rPr lang="en-US" sz="2800" b="1" dirty="0" smtClean="0">
+                <a:hlinkClick r:id="rId3"/>
+              </a:rPr>
+              <a:t>tddbootcamp.com</a:t>
+            </a:r>
+            <a:endParaRPr lang="en-US" sz="2800" b="1" dirty="0" smtClean="0"/>
+          </a:p>
+          <a:p>
+            <a:r>
               <a:rPr lang="en-US" sz="2800" b="1" dirty="0" smtClean="0"/>
-              <a:t>http://tddbootcamp.com</a:t>
+              <a:t>August 18-20 at Microsoft office in Southfield</a:t>
             </a:r>
             <a:endParaRPr lang="en-US" sz="2800" b="1" dirty="0"/>
           </a:p>

</xml_diff>

<commit_message>
using SaveProductService instead of GetProductService in DI since it's a better example
</commit_message>
<xml_diff>
--- a/SOLID Software Design Principles - without small methods.pptx
+++ b/SOLID Software Design Principles - without small methods.pptx
@@ -9,7 +9,7 @@
   </p:notesMasterIdLst>
   <p:sldIdLst>
     <p:sldId id="256" r:id="rId2"/>
-    <p:sldId id="357" r:id="rId3"/>
+    <p:sldId id="258" r:id="rId3"/>
     <p:sldId id="344" r:id="rId4"/>
     <p:sldId id="345" r:id="rId5"/>
     <p:sldId id="265" r:id="rId6"/>
@@ -84,7 +84,7 @@
     <p:sldId id="326" r:id="rId75"/>
     <p:sldId id="340" r:id="rId76"/>
     <p:sldId id="332" r:id="rId77"/>
-    <p:sldId id="333" r:id="rId78"/>
+    <p:sldId id="357" r:id="rId78"/>
   </p:sldIdLst>
   <p:sldSz cx="9144000" cy="6858000" type="screen4x3"/>
   <p:notesSz cx="6858000" cy="9144000"/>
@@ -269,7 +269,7 @@
             <a:fld id="{CE22DD2D-CE48-432A-B750-FE638311F72D}" type="datetimeFigureOut">
               <a:rPr lang="en-US" smtClean="0"/>
               <a:pPr/>
-              <a:t>4/28/2010</a:t>
+              <a:t>4/30/2010</a:t>
             </a:fld>
             <a:endParaRPr lang="en-US"/>
           </a:p>
@@ -2976,7 +2976,7 @@
             <a:fld id="{C3F416CD-67A3-4CF0-A210-F6AF31AC147F}" type="datetimeFigureOut">
               <a:rPr lang="en-US" smtClean="0"/>
               <a:pPr/>
-              <a:t>4/28/2010</a:t>
+              <a:t>4/30/2010</a:t>
             </a:fld>
             <a:endParaRPr lang="en-US"/>
           </a:p>
@@ -3156,7 +3156,7 @@
             <a:fld id="{C3F416CD-67A3-4CF0-A210-F6AF31AC147F}" type="datetimeFigureOut">
               <a:rPr lang="en-US" smtClean="0"/>
               <a:pPr/>
-              <a:t>4/28/2010</a:t>
+              <a:t>4/30/2010</a:t>
             </a:fld>
             <a:endParaRPr lang="en-US"/>
           </a:p>
@@ -3333,7 +3333,7 @@
             <a:fld id="{C3F416CD-67A3-4CF0-A210-F6AF31AC147F}" type="datetimeFigureOut">
               <a:rPr lang="en-US" smtClean="0"/>
               <a:pPr/>
-              <a:t>4/28/2010</a:t>
+              <a:t>4/30/2010</a:t>
             </a:fld>
             <a:endParaRPr lang="en-US"/>
           </a:p>
@@ -3500,7 +3500,7 @@
             <a:fld id="{C3F416CD-67A3-4CF0-A210-F6AF31AC147F}" type="datetimeFigureOut">
               <a:rPr lang="en-US" smtClean="0"/>
               <a:pPr/>
-              <a:t>4/28/2010</a:t>
+              <a:t>4/30/2010</a:t>
             </a:fld>
             <a:endParaRPr lang="en-US"/>
           </a:p>
@@ -3713,7 +3713,7 @@
             <a:fld id="{C3F416CD-67A3-4CF0-A210-F6AF31AC147F}" type="datetimeFigureOut">
               <a:rPr lang="en-US" smtClean="0"/>
               <a:pPr/>
-              <a:t>4/28/2010</a:t>
+              <a:t>4/30/2010</a:t>
             </a:fld>
             <a:endParaRPr lang="en-US"/>
           </a:p>
@@ -3998,7 +3998,7 @@
             <a:fld id="{C3F416CD-67A3-4CF0-A210-F6AF31AC147F}" type="datetimeFigureOut">
               <a:rPr lang="en-US" smtClean="0"/>
               <a:pPr/>
-              <a:t>4/28/2010</a:t>
+              <a:t>4/30/2010</a:t>
             </a:fld>
             <a:endParaRPr lang="en-US"/>
           </a:p>
@@ -4430,7 +4430,7 @@
             <a:fld id="{C3F416CD-67A3-4CF0-A210-F6AF31AC147F}" type="datetimeFigureOut">
               <a:rPr lang="en-US" smtClean="0"/>
               <a:pPr algn="l" eaLnBrk="1" latinLnBrk="0" hangingPunct="1"/>
-              <a:t>4/28/2010</a:t>
+              <a:t>4/30/2010</a:t>
             </a:fld>
             <a:endParaRPr lang="en-US"/>
           </a:p>
@@ -4550,7 +4550,7 @@
             <a:fld id="{C3F416CD-67A3-4CF0-A210-F6AF31AC147F}" type="datetimeFigureOut">
               <a:rPr lang="en-US" smtClean="0"/>
               <a:pPr/>
-              <a:t>4/28/2010</a:t>
+              <a:t>4/30/2010</a:t>
             </a:fld>
             <a:endParaRPr lang="en-US"/>
           </a:p>
@@ -4642,7 +4642,7 @@
             <a:fld id="{C3F416CD-67A3-4CF0-A210-F6AF31AC147F}" type="datetimeFigureOut">
               <a:rPr lang="en-US" smtClean="0"/>
               <a:pPr/>
-              <a:t>4/28/2010</a:t>
+              <a:t>4/30/2010</a:t>
             </a:fld>
             <a:endParaRPr lang="en-US"/>
           </a:p>
@@ -4933,7 +4933,7 @@
             <a:fld id="{C3F416CD-67A3-4CF0-A210-F6AF31AC147F}" type="datetimeFigureOut">
               <a:rPr lang="en-US" smtClean="0"/>
               <a:pPr/>
-              <a:t>4/28/2010</a:t>
+              <a:t>4/30/2010</a:t>
             </a:fld>
             <a:endParaRPr lang="en-US"/>
           </a:p>
@@ -5260,7 +5260,7 @@
             <a:fld id="{C3F416CD-67A3-4CF0-A210-F6AF31AC147F}" type="datetimeFigureOut">
               <a:rPr lang="en-US" smtClean="0"/>
               <a:pPr/>
-              <a:t>4/28/2010</a:t>
+              <a:t>4/30/2010</a:t>
             </a:fld>
             <a:endParaRPr lang="en-US"/>
           </a:p>
@@ -5481,7 +5481,7 @@
             <a:fld id="{C3F416CD-67A3-4CF0-A210-F6AF31AC147F}" type="datetimeFigureOut">
               <a:rPr lang="en-US" smtClean="0"/>
               <a:pPr algn="l" eaLnBrk="1" latinLnBrk="0" hangingPunct="1"/>
-              <a:t>4/28/2010</a:t>
+              <a:t>4/30/2010</a:t>
             </a:fld>
             <a:endParaRPr lang="en-US" sz="800" dirty="0">
               <a:solidFill>
@@ -20394,21 +20394,21 @@
                 <a:latin typeface="Courier New" pitchFamily="49" charset="0"/>
                 <a:cs typeface="Courier New" pitchFamily="49" charset="0"/>
               </a:rPr>
-              <a:t>    public Product Get(</a:t>
+              <a:t>    public void Save(Product </a:t>
             </a:r>
             <a:r>
               <a:rPr lang="en-US" sz="1800" b="1" dirty="0" err="1" smtClean="0">
                 <a:latin typeface="Courier New" pitchFamily="49" charset="0"/>
                 <a:cs typeface="Courier New" pitchFamily="49" charset="0"/>
               </a:rPr>
-              <a:t>int</a:t>
+              <a:t>product</a:t>
             </a:r>
             <a:r>
               <a:rPr lang="en-US" sz="1800" b="1" dirty="0" smtClean="0">
                 <a:latin typeface="Courier New" pitchFamily="49" charset="0"/>
                 <a:cs typeface="Courier New" pitchFamily="49" charset="0"/>
               </a:rPr>
-              <a:t> id) { ... }</a:t>
+              <a:t>) { ... }</a:t>
             </a:r>
           </a:p>
           <a:p>
@@ -20476,21 +20476,21 @@
                 <a:latin typeface="Courier New" pitchFamily="49" charset="0"/>
                 <a:cs typeface="Courier New" pitchFamily="49" charset="0"/>
               </a:rPr>
-              <a:t>    Product Get(</a:t>
+              <a:t>    void Save(Product </a:t>
             </a:r>
             <a:r>
               <a:rPr lang="en-US" sz="1800" b="1" dirty="0" err="1" smtClean="0">
                 <a:latin typeface="Courier New" pitchFamily="49" charset="0"/>
                 <a:cs typeface="Courier New" pitchFamily="49" charset="0"/>
               </a:rPr>
-              <a:t>int</a:t>
+              <a:t>product</a:t>
             </a:r>
             <a:r>
               <a:rPr lang="en-US" sz="1800" b="1" dirty="0" smtClean="0">
                 <a:latin typeface="Courier New" pitchFamily="49" charset="0"/>
                 <a:cs typeface="Courier New" pitchFamily="49" charset="0"/>
               </a:rPr>
-              <a:t> id);</a:t>
+              <a:t>);</a:t>
             </a:r>
           </a:p>
           <a:p>
@@ -20585,7 +20585,7 @@
         <p:spPr>
           <a:xfrm>
             <a:off x="609600" y="1600200"/>
-            <a:ext cx="8077200" cy="4524315"/>
+            <a:ext cx="8077200" cy="4801314"/>
           </a:xfrm>
           <a:prstGeom prst="rect">
             <a:avLst/>
@@ -20614,21 +20614,28 @@
                 <a:latin typeface="Courier New" pitchFamily="49" charset="0"/>
                 <a:cs typeface="Courier New" pitchFamily="49" charset="0"/>
               </a:rPr>
-              <a:t>GetProductService</a:t>
+              <a:t>SaveProductService</a:t>
             </a:r>
             <a:r>
               <a:rPr lang="en-US" b="1" dirty="0" smtClean="0">
                 <a:latin typeface="Courier New" pitchFamily="49" charset="0"/>
                 <a:cs typeface="Courier New" pitchFamily="49" charset="0"/>
               </a:rPr>
-              <a:t> : </a:t>
+              <a:t> </a:t>
+            </a:r>
+            <a:r>
+              <a:rPr lang="en-US" b="1" dirty="0" smtClean="0">
+                <a:latin typeface="Courier New" pitchFamily="49" charset="0"/>
+                <a:cs typeface="Courier New" pitchFamily="49" charset="0"/>
+              </a:rPr>
+              <a:t>: </a:t>
             </a:r>
             <a:r>
               <a:rPr lang="en-US" b="1" dirty="0" err="1" smtClean="0">
                 <a:latin typeface="Courier New" pitchFamily="49" charset="0"/>
                 <a:cs typeface="Courier New" pitchFamily="49" charset="0"/>
               </a:rPr>
-              <a:t>IGetProductService</a:t>
+              <a:t>ISaveProductService</a:t>
             </a:r>
             <a:endParaRPr lang="en-US" b="1" dirty="0" smtClean="0">
               <a:latin typeface="Courier New" pitchFamily="49" charset="0"/>
@@ -20700,7 +20707,7 @@
                 <a:latin typeface="Courier New" pitchFamily="49" charset="0"/>
                 <a:cs typeface="Courier New" pitchFamily="49" charset="0"/>
               </a:rPr>
-              <a:t>GetProductService</a:t>
+              <a:t>SaveProductService</a:t>
             </a:r>
             <a:r>
               <a:rPr lang="en-US" b="1" dirty="0" smtClean="0">
@@ -20823,49 +20830,78 @@
                 <a:latin typeface="Courier New" pitchFamily="49" charset="0"/>
                 <a:cs typeface="Courier New" pitchFamily="49" charset="0"/>
               </a:rPr>
-              <a:t>    public </a:t>
+              <a:t>    </a:t>
+            </a:r>
+            <a:r>
+              <a:rPr lang="en-US" b="1" dirty="0" smtClean="0">
+                <a:latin typeface="Courier New" pitchFamily="49" charset="0"/>
+                <a:cs typeface="Courier New" pitchFamily="49" charset="0"/>
+              </a:rPr>
+              <a:t>public void Save(Product </a:t>
             </a:r>
             <a:r>
               <a:rPr lang="en-US" b="1" dirty="0" err="1" smtClean="0">
                 <a:latin typeface="Courier New" pitchFamily="49" charset="0"/>
                 <a:cs typeface="Courier New" pitchFamily="49" charset="0"/>
               </a:rPr>
-              <a:t>IList</a:t>
+              <a:t>product</a:t>
             </a:r>
             <a:r>
               <a:rPr lang="en-US" b="1" dirty="0" smtClean="0">
                 <a:latin typeface="Courier New" pitchFamily="49" charset="0"/>
                 <a:cs typeface="Courier New" pitchFamily="49" charset="0"/>
               </a:rPr>
-              <a:t>&lt;Product&gt; </a:t>
+              <a:t>)</a:t>
+            </a:r>
+          </a:p>
+          <a:p>
+            <a:r>
+              <a:rPr lang="en-US" b="1" dirty="0" smtClean="0">
+                <a:latin typeface="Courier New" pitchFamily="49" charset="0"/>
+                <a:cs typeface="Courier New" pitchFamily="49" charset="0"/>
+              </a:rPr>
+              <a:t>    {</a:t>
+            </a:r>
+          </a:p>
+          <a:p>
+            <a:r>
+              <a:rPr lang="en-US" b="1" dirty="0" smtClean="0">
+                <a:latin typeface="Courier New" pitchFamily="49" charset="0"/>
+                <a:cs typeface="Courier New" pitchFamily="49" charset="0"/>
+              </a:rPr>
+              <a:t>        Validate(product);</a:t>
+            </a:r>
+          </a:p>
+          <a:p>
+            <a:r>
+              <a:rPr lang="en-US" b="1" dirty="0" smtClean="0">
+                <a:latin typeface="Courier New" pitchFamily="49" charset="0"/>
+                <a:cs typeface="Courier New" pitchFamily="49" charset="0"/>
+              </a:rPr>
+              <a:t>        return _</a:t>
             </a:r>
             <a:r>
               <a:rPr lang="en-US" b="1" dirty="0" err="1" smtClean="0">
                 <a:latin typeface="Courier New" pitchFamily="49" charset="0"/>
                 <a:cs typeface="Courier New" pitchFamily="49" charset="0"/>
               </a:rPr>
-              <a:t>GetProductById</a:t>
+              <a:t>productRepository.Save</a:t>
             </a:r>
             <a:r>
               <a:rPr lang="en-US" b="1" dirty="0" smtClean="0">
                 <a:latin typeface="Courier New" pitchFamily="49" charset="0"/>
                 <a:cs typeface="Courier New" pitchFamily="49" charset="0"/>
               </a:rPr>
-              <a:t>(</a:t>
-            </a:r>
-            <a:r>
-              <a:rPr lang="en-US" b="1" dirty="0" err="1" smtClean="0">
-                <a:latin typeface="Courier New" pitchFamily="49" charset="0"/>
-                <a:cs typeface="Courier New" pitchFamily="49" charset="0"/>
-              </a:rPr>
-              <a:t>int</a:t>
-            </a:r>
+              <a:t>(product);</a:t>
+            </a:r>
+          </a:p>
+          <a:p>
             <a:r>
               <a:rPr lang="en-US" b="1" dirty="0" smtClean="0">
                 <a:latin typeface="Courier New" pitchFamily="49" charset="0"/>
                 <a:cs typeface="Courier New" pitchFamily="49" charset="0"/>
               </a:rPr>
-              <a:t> id)</a:t>
+              <a:t>    }</a:t>
             </a:r>
           </a:p>
           <a:p>
@@ -20874,49 +20910,12 @@
                 <a:latin typeface="Courier New" pitchFamily="49" charset="0"/>
                 <a:cs typeface="Courier New" pitchFamily="49" charset="0"/>
               </a:rPr>
-              <a:t>    {</a:t>
-            </a:r>
-          </a:p>
-          <a:p>
-            <a:r>
-              <a:rPr lang="en-US" b="1" dirty="0" smtClean="0">
-                <a:latin typeface="Courier New" pitchFamily="49" charset="0"/>
-                <a:cs typeface="Courier New" pitchFamily="49" charset="0"/>
-              </a:rPr>
-              <a:t>        return _</a:t>
-            </a:r>
-            <a:r>
-              <a:rPr lang="en-US" b="1" dirty="0" err="1" smtClean="0">
-                <a:latin typeface="Courier New" pitchFamily="49" charset="0"/>
-                <a:cs typeface="Courier New" pitchFamily="49" charset="0"/>
-              </a:rPr>
-              <a:t>productRepository.Get</a:t>
-            </a:r>
-            <a:r>
-              <a:rPr lang="en-US" b="1" dirty="0" smtClean="0">
-                <a:latin typeface="Courier New" pitchFamily="49" charset="0"/>
-                <a:cs typeface="Courier New" pitchFamily="49" charset="0"/>
-              </a:rPr>
-              <a:t>(id);</a:t>
-            </a:r>
-          </a:p>
-          <a:p>
-            <a:r>
-              <a:rPr lang="en-US" b="1" dirty="0" smtClean="0">
-                <a:latin typeface="Courier New" pitchFamily="49" charset="0"/>
-                <a:cs typeface="Courier New" pitchFamily="49" charset="0"/>
-              </a:rPr>
-              <a:t>    }</a:t>
-            </a:r>
-          </a:p>
-          <a:p>
-            <a:r>
-              <a:rPr lang="en-US" b="1" dirty="0" smtClean="0">
-                <a:latin typeface="Courier New" pitchFamily="49" charset="0"/>
-                <a:cs typeface="Courier New" pitchFamily="49" charset="0"/>
-              </a:rPr>
               <a:t>}</a:t>
             </a:r>
+            <a:endParaRPr lang="en-US" b="1" dirty="0" smtClean="0">
+              <a:latin typeface="Courier New" pitchFamily="49" charset="0"/>
+              <a:cs typeface="Courier New" pitchFamily="49" charset="0"/>
+            </a:endParaRPr>
           </a:p>
           <a:p>
             <a:endParaRPr lang="en-US" b="1" dirty="0">
@@ -21013,7 +21012,7 @@
         <p:spPr>
           <a:xfrm>
             <a:off x="609600" y="2514600"/>
-            <a:ext cx="8077200" cy="2308324"/>
+            <a:ext cx="8077200" cy="2862322"/>
           </a:xfrm>
           <a:prstGeom prst="rect">
             <a:avLst/>
@@ -21042,7 +21041,7 @@
                 <a:latin typeface="Courier New" pitchFamily="49" charset="0"/>
                 <a:cs typeface="Courier New" pitchFamily="49" charset="0"/>
               </a:rPr>
-              <a:t>GetProductService</a:t>
+              <a:t>SaveProductService</a:t>
             </a:r>
             <a:endParaRPr lang="en-US" b="1" dirty="0" smtClean="0">
               <a:latin typeface="Courier New" pitchFamily="49" charset="0"/>
@@ -21064,58 +21063,96 @@
                 <a:latin typeface="Courier New" pitchFamily="49" charset="0"/>
                 <a:cs typeface="Courier New" pitchFamily="49" charset="0"/>
               </a:rPr>
-              <a:t>    public </a:t>
+              <a:t>    public void Save(Product </a:t>
             </a:r>
             <a:r>
               <a:rPr lang="en-US" b="1" dirty="0" err="1" smtClean="0">
                 <a:latin typeface="Courier New" pitchFamily="49" charset="0"/>
                 <a:cs typeface="Courier New" pitchFamily="49" charset="0"/>
               </a:rPr>
-              <a:t>IList</a:t>
+              <a:t>product</a:t>
             </a:r>
             <a:r>
               <a:rPr lang="en-US" b="1" dirty="0" smtClean="0">
                 <a:latin typeface="Courier New" pitchFamily="49" charset="0"/>
                 <a:cs typeface="Courier New" pitchFamily="49" charset="0"/>
               </a:rPr>
-              <a:t>&lt;Product&gt; </a:t>
+              <a:t>)</a:t>
+            </a:r>
+          </a:p>
+          <a:p>
+            <a:r>
+              <a:rPr lang="en-US" b="1" dirty="0" smtClean="0">
+                <a:latin typeface="Courier New" pitchFamily="49" charset="0"/>
+                <a:cs typeface="Courier New" pitchFamily="49" charset="0"/>
+              </a:rPr>
+              <a:t>    {</a:t>
+            </a:r>
+          </a:p>
+          <a:p>
+            <a:r>
+              <a:rPr lang="en-US" b="1" dirty="0" smtClean="0">
+                <a:latin typeface="Courier New" pitchFamily="49" charset="0"/>
+                <a:cs typeface="Courier New" pitchFamily="49" charset="0"/>
+              </a:rPr>
+              <a:t>        Validate(product);</a:t>
+            </a:r>
+          </a:p>
+          <a:p>
+            <a:endParaRPr lang="en-US" b="1" dirty="0" smtClean="0">
+              <a:latin typeface="Courier New" pitchFamily="49" charset="0"/>
+              <a:cs typeface="Courier New" pitchFamily="49" charset="0"/>
+            </a:endParaRPr>
+          </a:p>
+          <a:p>
+            <a:r>
+              <a:rPr lang="en-US" b="1" dirty="0" smtClean="0">
+                <a:latin typeface="Courier New" pitchFamily="49" charset="0"/>
+                <a:cs typeface="Courier New" pitchFamily="49" charset="0"/>
+              </a:rPr>
+              <a:t>        </a:t>
             </a:r>
             <a:r>
               <a:rPr lang="en-US" b="1" dirty="0" err="1" smtClean="0">
                 <a:latin typeface="Courier New" pitchFamily="49" charset="0"/>
                 <a:cs typeface="Courier New" pitchFamily="49" charset="0"/>
               </a:rPr>
-              <a:t>GetProductById</a:t>
+              <a:t>var</a:t>
             </a:r>
             <a:r>
               <a:rPr lang="en-US" b="1" dirty="0" smtClean="0">
                 <a:latin typeface="Courier New" pitchFamily="49" charset="0"/>
                 <a:cs typeface="Courier New" pitchFamily="49" charset="0"/>
               </a:rPr>
-              <a:t>(</a:t>
+              <a:t> </a:t>
             </a:r>
             <a:r>
               <a:rPr lang="en-US" b="1" dirty="0" err="1" smtClean="0">
                 <a:latin typeface="Courier New" pitchFamily="49" charset="0"/>
                 <a:cs typeface="Courier New" pitchFamily="49" charset="0"/>
               </a:rPr>
-              <a:t>int</a:t>
+              <a:t>productRepository</a:t>
             </a:r>
             <a:r>
               <a:rPr lang="en-US" b="1" dirty="0" smtClean="0">
                 <a:latin typeface="Courier New" pitchFamily="49" charset="0"/>
                 <a:cs typeface="Courier New" pitchFamily="49" charset="0"/>
               </a:rPr>
-              <a:t> id)</a:t>
-            </a:r>
-          </a:p>
-          <a:p>
+              <a:t> = new </a:t>
+            </a:r>
+            <a:r>
+              <a:rPr lang="en-US" b="1" dirty="0" err="1" smtClean="0">
+                <a:latin typeface="Courier New" pitchFamily="49" charset="0"/>
+                <a:cs typeface="Courier New" pitchFamily="49" charset="0"/>
+              </a:rPr>
+              <a:t>ProductRepository</a:t>
+            </a:r>
             <a:r>
               <a:rPr lang="en-US" b="1" dirty="0" smtClean="0">
                 <a:latin typeface="Courier New" pitchFamily="49" charset="0"/>
                 <a:cs typeface="Courier New" pitchFamily="49" charset="0"/>
               </a:rPr>
-              <a:t>    {</a:t>
+              <a:t>();</a:t>
             </a:r>
           </a:p>
           <a:p>
@@ -21124,72 +21161,21 @@
                 <a:latin typeface="Courier New" pitchFamily="49" charset="0"/>
                 <a:cs typeface="Courier New" pitchFamily="49" charset="0"/>
               </a:rPr>
-              <a:t>        </a:t>
+              <a:t>        return </a:t>
             </a:r>
             <a:r>
               <a:rPr lang="en-US" b="1" dirty="0" err="1" smtClean="0">
                 <a:latin typeface="Courier New" pitchFamily="49" charset="0"/>
                 <a:cs typeface="Courier New" pitchFamily="49" charset="0"/>
               </a:rPr>
-              <a:t>var</a:t>
+              <a:t>productRepository.Save</a:t>
             </a:r>
             <a:r>
               <a:rPr lang="en-US" b="1" dirty="0" smtClean="0">
                 <a:latin typeface="Courier New" pitchFamily="49" charset="0"/>
                 <a:cs typeface="Courier New" pitchFamily="49" charset="0"/>
               </a:rPr>
-              <a:t> </a:t>
-            </a:r>
-            <a:r>
-              <a:rPr lang="en-US" b="1" dirty="0" err="1" smtClean="0">
-                <a:latin typeface="Courier New" pitchFamily="49" charset="0"/>
-                <a:cs typeface="Courier New" pitchFamily="49" charset="0"/>
-              </a:rPr>
-              <a:t>productRepository</a:t>
-            </a:r>
-            <a:r>
-              <a:rPr lang="en-US" b="1" dirty="0" smtClean="0">
-                <a:latin typeface="Courier New" pitchFamily="49" charset="0"/>
-                <a:cs typeface="Courier New" pitchFamily="49" charset="0"/>
-              </a:rPr>
-              <a:t> = new </a:t>
-            </a:r>
-            <a:r>
-              <a:rPr lang="en-US" b="1" dirty="0" err="1" smtClean="0">
-                <a:latin typeface="Courier New" pitchFamily="49" charset="0"/>
-                <a:cs typeface="Courier New" pitchFamily="49" charset="0"/>
-              </a:rPr>
-              <a:t>ProductRepository</a:t>
-            </a:r>
-            <a:r>
-              <a:rPr lang="en-US" b="1" dirty="0" smtClean="0">
-                <a:latin typeface="Courier New" pitchFamily="49" charset="0"/>
-                <a:cs typeface="Courier New" pitchFamily="49" charset="0"/>
-              </a:rPr>
-              <a:t>();</a:t>
-            </a:r>
-          </a:p>
-          <a:p>
-            <a:r>
-              <a:rPr lang="en-US" b="1" dirty="0" smtClean="0">
-                <a:latin typeface="Courier New" pitchFamily="49" charset="0"/>
-                <a:cs typeface="Courier New" pitchFamily="49" charset="0"/>
-              </a:rPr>
-              <a:t>        return </a:t>
-            </a:r>
-            <a:r>
-              <a:rPr lang="en-US" b="1" dirty="0" err="1" smtClean="0">
-                <a:latin typeface="Courier New" pitchFamily="49" charset="0"/>
-                <a:cs typeface="Courier New" pitchFamily="49" charset="0"/>
-              </a:rPr>
-              <a:t>productRepository.Get</a:t>
-            </a:r>
-            <a:r>
-              <a:rPr lang="en-US" b="1" dirty="0" smtClean="0">
-                <a:latin typeface="Courier New" pitchFamily="49" charset="0"/>
-                <a:cs typeface="Courier New" pitchFamily="49" charset="0"/>
-              </a:rPr>
-              <a:t>(id);</a:t>
+              <a:t>(product);</a:t>
             </a:r>
           </a:p>
           <a:p>
@@ -21753,21 +21739,35 @@
                 <a:latin typeface="Courier New" pitchFamily="49" charset="0"/>
                 <a:cs typeface="Courier New" pitchFamily="49" charset="0"/>
               </a:rPr>
-              <a:t>public class </a:t>
+              <a:t>public </a:t>
+            </a:r>
+            <a:r>
+              <a:rPr lang="en-US" b="1" dirty="0" smtClean="0">
+                <a:latin typeface="Courier New" pitchFamily="49" charset="0"/>
+                <a:cs typeface="Courier New" pitchFamily="49" charset="0"/>
+              </a:rPr>
+              <a:t>class </a:t>
             </a:r>
             <a:r>
               <a:rPr lang="en-US" b="1" dirty="0" err="1" smtClean="0">
                 <a:latin typeface="Courier New" pitchFamily="49" charset="0"/>
                 <a:cs typeface="Courier New" pitchFamily="49" charset="0"/>
               </a:rPr>
-              <a:t>GetProductService</a:t>
+              <a:t>SaveProductService</a:t>
             </a:r>
             <a:r>
               <a:rPr lang="en-US" b="1" dirty="0" smtClean="0">
                 <a:latin typeface="Courier New" pitchFamily="49" charset="0"/>
                 <a:cs typeface="Courier New" pitchFamily="49" charset="0"/>
               </a:rPr>
-              <a:t> : </a:t>
+              <a:t> </a:t>
+            </a:r>
+            <a:r>
+              <a:rPr lang="en-US" b="1" dirty="0" smtClean="0">
+                <a:latin typeface="Courier New" pitchFamily="49" charset="0"/>
+                <a:cs typeface="Courier New" pitchFamily="49" charset="0"/>
+              </a:rPr>
+              <a:t>: </a:t>
             </a:r>
             <a:r>
               <a:rPr lang="en-US" b="1" dirty="0" err="1" smtClean="0">
@@ -21777,7 +21777,7 @@
                 <a:latin typeface="Courier New" pitchFamily="49" charset="0"/>
                 <a:cs typeface="Courier New" pitchFamily="49" charset="0"/>
               </a:rPr>
-              <a:t>IGetProductService</a:t>
+              <a:t>ISaveProductService</a:t>
             </a:r>
             <a:endParaRPr lang="en-US" b="1" dirty="0" smtClean="0">
               <a:solidFill>
@@ -21852,7 +21852,7 @@
                 <a:latin typeface="Courier New" pitchFamily="49" charset="0"/>
                 <a:cs typeface="Courier New" pitchFamily="49" charset="0"/>
               </a:rPr>
-              <a:t>GetProductService</a:t>
+              <a:t>SaveProductService</a:t>
             </a:r>
             <a:r>
               <a:rPr lang="en-US" b="1" dirty="0" smtClean="0">
@@ -21975,49 +21975,71 @@
                 <a:latin typeface="Courier New" pitchFamily="49" charset="0"/>
                 <a:cs typeface="Courier New" pitchFamily="49" charset="0"/>
               </a:rPr>
-              <a:t>    public </a:t>
+              <a:t>    public void Save(Product </a:t>
             </a:r>
             <a:r>
               <a:rPr lang="en-US" b="1" dirty="0" err="1" smtClean="0">
                 <a:latin typeface="Courier New" pitchFamily="49" charset="0"/>
                 <a:cs typeface="Courier New" pitchFamily="49" charset="0"/>
               </a:rPr>
-              <a:t>IList</a:t>
+              <a:t>product</a:t>
             </a:r>
             <a:r>
               <a:rPr lang="en-US" b="1" dirty="0" smtClean="0">
                 <a:latin typeface="Courier New" pitchFamily="49" charset="0"/>
                 <a:cs typeface="Courier New" pitchFamily="49" charset="0"/>
               </a:rPr>
-              <a:t>&lt;Product&gt; </a:t>
+              <a:t>)</a:t>
+            </a:r>
+          </a:p>
+          <a:p>
+            <a:r>
+              <a:rPr lang="en-US" b="1" dirty="0" smtClean="0">
+                <a:latin typeface="Courier New" pitchFamily="49" charset="0"/>
+                <a:cs typeface="Courier New" pitchFamily="49" charset="0"/>
+              </a:rPr>
+              <a:t>    {</a:t>
+            </a:r>
+          </a:p>
+          <a:p>
+            <a:r>
+              <a:rPr lang="en-US" b="1" dirty="0" smtClean="0">
+                <a:latin typeface="Courier New" pitchFamily="49" charset="0"/>
+                <a:cs typeface="Courier New" pitchFamily="49" charset="0"/>
+              </a:rPr>
+              <a:t>        Validate(product);</a:t>
+            </a:r>
+          </a:p>
+          <a:p>
+            <a:r>
+              <a:rPr lang="en-US" b="1" dirty="0" smtClean="0">
+                <a:latin typeface="Courier New" pitchFamily="49" charset="0"/>
+                <a:cs typeface="Courier New" pitchFamily="49" charset="0"/>
+              </a:rPr>
+              <a:t>        return _</a:t>
             </a:r>
             <a:r>
               <a:rPr lang="en-US" b="1" dirty="0" err="1" smtClean="0">
                 <a:latin typeface="Courier New" pitchFamily="49" charset="0"/>
                 <a:cs typeface="Courier New" pitchFamily="49" charset="0"/>
               </a:rPr>
-              <a:t>GetProductById</a:t>
+              <a:t>productRepository.Save</a:t>
             </a:r>
             <a:r>
               <a:rPr lang="en-US" b="1" dirty="0" smtClean="0">
                 <a:latin typeface="Courier New" pitchFamily="49" charset="0"/>
                 <a:cs typeface="Courier New" pitchFamily="49" charset="0"/>
               </a:rPr>
-              <a:t>(</a:t>
-            </a:r>
-            <a:r>
-              <a:rPr lang="en-US" b="1" dirty="0" err="1" smtClean="0">
-                <a:latin typeface="Courier New" pitchFamily="49" charset="0"/>
-                <a:cs typeface="Courier New" pitchFamily="49" charset="0"/>
-              </a:rPr>
-              <a:t>int</a:t>
-            </a:r>
+              <a:t>(product);</a:t>
+            </a:r>
+          </a:p>
+          <a:p>
             <a:r>
               <a:rPr lang="en-US" b="1" dirty="0" smtClean="0">
                 <a:latin typeface="Courier New" pitchFamily="49" charset="0"/>
                 <a:cs typeface="Courier New" pitchFamily="49" charset="0"/>
               </a:rPr>
-              <a:t> id)</a:t>
+              <a:t>    }</a:t>
             </a:r>
           </a:p>
           <a:p>
@@ -22026,51 +22048,8 @@
                 <a:latin typeface="Courier New" pitchFamily="49" charset="0"/>
                 <a:cs typeface="Courier New" pitchFamily="49" charset="0"/>
               </a:rPr>
-              <a:t>    {</a:t>
-            </a:r>
-          </a:p>
-          <a:p>
-            <a:r>
-              <a:rPr lang="en-US" b="1" dirty="0" smtClean="0">
-                <a:latin typeface="Courier New" pitchFamily="49" charset="0"/>
-                <a:cs typeface="Courier New" pitchFamily="49" charset="0"/>
-              </a:rPr>
-              <a:t>        return _</a:t>
-            </a:r>
-            <a:r>
-              <a:rPr lang="en-US" b="1" dirty="0" err="1" smtClean="0">
-                <a:latin typeface="Courier New" pitchFamily="49" charset="0"/>
-                <a:cs typeface="Courier New" pitchFamily="49" charset="0"/>
-              </a:rPr>
-              <a:t>productRepository.Get</a:t>
-            </a:r>
-            <a:r>
-              <a:rPr lang="en-US" b="1" dirty="0" smtClean="0">
-                <a:latin typeface="Courier New" pitchFamily="49" charset="0"/>
-                <a:cs typeface="Courier New" pitchFamily="49" charset="0"/>
-              </a:rPr>
-              <a:t>(id);</a:t>
-            </a:r>
-          </a:p>
-          <a:p>
-            <a:r>
-              <a:rPr lang="en-US" b="1" dirty="0" smtClean="0">
-                <a:latin typeface="Courier New" pitchFamily="49" charset="0"/>
-                <a:cs typeface="Courier New" pitchFamily="49" charset="0"/>
-              </a:rPr>
-              <a:t>    }</a:t>
-            </a:r>
-          </a:p>
-          <a:p>
-            <a:r>
-              <a:rPr lang="en-US" b="1" dirty="0" smtClean="0">
-                <a:latin typeface="Courier New" pitchFamily="49" charset="0"/>
-                <a:cs typeface="Courier New" pitchFamily="49" charset="0"/>
-              </a:rPr>
               <a:t>}</a:t>
             </a:r>
-          </a:p>
-          <a:p>
             <a:endParaRPr lang="en-US" b="1" dirty="0">
               <a:latin typeface="Courier New" pitchFamily="49" charset="0"/>
               <a:cs typeface="Courier New" pitchFamily="49" charset="0"/>
@@ -22753,8 +22732,8 @@
         </p:nvSpPr>
         <p:spPr>
           <a:xfrm>
-            <a:off x="609600" y="1752600"/>
-            <a:ext cx="8001000" cy="1200329"/>
+            <a:off x="304800" y="1752600"/>
+            <a:ext cx="8534400" cy="1200329"/>
           </a:xfrm>
           <a:prstGeom prst="rect">
             <a:avLst/>
@@ -22822,21 +22801,28 @@
                 <a:latin typeface="Courier New" pitchFamily="49" charset="0"/>
                 <a:cs typeface="Courier New" pitchFamily="49" charset="0"/>
               </a:rPr>
-              <a:t>IGetProductService</a:t>
+              <a:t>ISaveProductService</a:t>
             </a:r>
             <a:r>
               <a:rPr lang="en-US" b="1" dirty="0" smtClean="0">
                 <a:latin typeface="Courier New" pitchFamily="49" charset="0"/>
                 <a:cs typeface="Courier New" pitchFamily="49" charset="0"/>
               </a:rPr>
-              <a:t>&gt;().Use&lt;</a:t>
+              <a:t>&gt;().</a:t>
+            </a:r>
+            <a:r>
+              <a:rPr lang="en-US" b="1" dirty="0" smtClean="0">
+                <a:latin typeface="Courier New" pitchFamily="49" charset="0"/>
+                <a:cs typeface="Courier New" pitchFamily="49" charset="0"/>
+              </a:rPr>
+              <a:t>Use&lt;</a:t>
             </a:r>
             <a:r>
               <a:rPr lang="en-US" b="1" dirty="0" err="1" smtClean="0">
                 <a:latin typeface="Courier New" pitchFamily="49" charset="0"/>
                 <a:cs typeface="Courier New" pitchFamily="49" charset="0"/>
               </a:rPr>
-              <a:t>GetProductService</a:t>
+              <a:t>SaveProductService</a:t>
             </a:r>
             <a:r>
               <a:rPr lang="en-US" b="1" dirty="0" smtClean="0">
@@ -25404,11 +25390,7 @@
           <a:p>
             <a:r>
               <a:rPr lang="en-US" sz="2600" dirty="0" smtClean="0"/>
-              <a:t>My </a:t>
-            </a:r>
-            <a:r>
-              <a:rPr lang="en-US" sz="2600" dirty="0" smtClean="0"/>
-              <a:t>slides </a:t>
+              <a:t>My slides </a:t>
             </a:r>
           </a:p>
           <a:p>
@@ -25464,11 +25446,7 @@
           <a:p>
             <a:r>
               <a:rPr lang="en-US" sz="2800" dirty="0" smtClean="0"/>
-              <a:t>email</a:t>
-            </a:r>
-            <a:r>
-              <a:rPr lang="en-US" sz="2800" dirty="0" smtClean="0"/>
-              <a:t>: </a:t>
+              <a:t>email: </a:t>
             </a:r>
             <a:r>
               <a:rPr lang="en-US" sz="2800" b="1" dirty="0" smtClean="0"/>
@@ -25504,13 +25482,7 @@
               <a:rPr lang="en-US" sz="2800" b="1" dirty="0" smtClean="0">
                 <a:hlinkClick r:id="rId2"/>
               </a:rPr>
-              <a:t>http://</a:t>
-            </a:r>
-            <a:r>
-              <a:rPr lang="en-US" sz="2800" b="1" dirty="0" smtClean="0">
-                <a:hlinkClick r:id="rId2"/>
-              </a:rPr>
-              <a:t>jonkruger.com/blog</a:t>
+              <a:t>http://jonkruger.com/blog</a:t>
             </a:r>
             <a:endParaRPr lang="en-US" sz="2800" b="1" dirty="0" smtClean="0"/>
           </a:p>
@@ -25530,13 +25502,7 @@
               <a:rPr lang="en-US" sz="2800" b="1" dirty="0" smtClean="0">
                 <a:hlinkClick r:id="rId3"/>
               </a:rPr>
-              <a:t>http://</a:t>
-            </a:r>
-            <a:r>
-              <a:rPr lang="en-US" sz="2800" b="1" dirty="0" smtClean="0">
-                <a:hlinkClick r:id="rId3"/>
-              </a:rPr>
-              <a:t>tddbootcamp.com</a:t>
+              <a:t>http://tddbootcamp.com</a:t>
             </a:r>
             <a:endParaRPr lang="en-US" sz="2800" b="1" dirty="0" smtClean="0"/>
           </a:p>

</xml_diff>